<commit_message>
Escrevi vários capítulos do TCC, mas ainda serão revisados
</commit_message>
<xml_diff>
--- a/imagens/ppt/desenhos_TCC.pptx
+++ b/imagens/ppt/desenhos_TCC.pptx
@@ -260,7 +260,7 @@
           <a:p>
             <a:fld id="{FF8DFCC8-87C9-4FC8-94E9-5E6D7726585C}" type="datetimeFigureOut">
               <a:rPr lang="pt-BR" smtClean="0"/>
-              <a:t>12/12/2021</a:t>
+              <a:t>13/12/2021</a:t>
             </a:fld>
             <a:endParaRPr lang="pt-BR"/>
           </a:p>
@@ -430,7 +430,7 @@
           <a:p>
             <a:fld id="{FF8DFCC8-87C9-4FC8-94E9-5E6D7726585C}" type="datetimeFigureOut">
               <a:rPr lang="pt-BR" smtClean="0"/>
-              <a:t>12/12/2021</a:t>
+              <a:t>13/12/2021</a:t>
             </a:fld>
             <a:endParaRPr lang="pt-BR"/>
           </a:p>
@@ -610,7 +610,7 @@
           <a:p>
             <a:fld id="{FF8DFCC8-87C9-4FC8-94E9-5E6D7726585C}" type="datetimeFigureOut">
               <a:rPr lang="pt-BR" smtClean="0"/>
-              <a:t>12/12/2021</a:t>
+              <a:t>13/12/2021</a:t>
             </a:fld>
             <a:endParaRPr lang="pt-BR"/>
           </a:p>
@@ -780,7 +780,7 @@
           <a:p>
             <a:fld id="{FF8DFCC8-87C9-4FC8-94E9-5E6D7726585C}" type="datetimeFigureOut">
               <a:rPr lang="pt-BR" smtClean="0"/>
-              <a:t>12/12/2021</a:t>
+              <a:t>13/12/2021</a:t>
             </a:fld>
             <a:endParaRPr lang="pt-BR"/>
           </a:p>
@@ -1024,7 +1024,7 @@
           <a:p>
             <a:fld id="{FF8DFCC8-87C9-4FC8-94E9-5E6D7726585C}" type="datetimeFigureOut">
               <a:rPr lang="pt-BR" smtClean="0"/>
-              <a:t>12/12/2021</a:t>
+              <a:t>13/12/2021</a:t>
             </a:fld>
             <a:endParaRPr lang="pt-BR"/>
           </a:p>
@@ -1256,7 +1256,7 @@
           <a:p>
             <a:fld id="{FF8DFCC8-87C9-4FC8-94E9-5E6D7726585C}" type="datetimeFigureOut">
               <a:rPr lang="pt-BR" smtClean="0"/>
-              <a:t>12/12/2021</a:t>
+              <a:t>13/12/2021</a:t>
             </a:fld>
             <a:endParaRPr lang="pt-BR"/>
           </a:p>
@@ -1623,7 +1623,7 @@
           <a:p>
             <a:fld id="{FF8DFCC8-87C9-4FC8-94E9-5E6D7726585C}" type="datetimeFigureOut">
               <a:rPr lang="pt-BR" smtClean="0"/>
-              <a:t>12/12/2021</a:t>
+              <a:t>13/12/2021</a:t>
             </a:fld>
             <a:endParaRPr lang="pt-BR"/>
           </a:p>
@@ -1741,7 +1741,7 @@
           <a:p>
             <a:fld id="{FF8DFCC8-87C9-4FC8-94E9-5E6D7726585C}" type="datetimeFigureOut">
               <a:rPr lang="pt-BR" smtClean="0"/>
-              <a:t>12/12/2021</a:t>
+              <a:t>13/12/2021</a:t>
             </a:fld>
             <a:endParaRPr lang="pt-BR"/>
           </a:p>
@@ -1836,7 +1836,7 @@
           <a:p>
             <a:fld id="{FF8DFCC8-87C9-4FC8-94E9-5E6D7726585C}" type="datetimeFigureOut">
               <a:rPr lang="pt-BR" smtClean="0"/>
-              <a:t>12/12/2021</a:t>
+              <a:t>13/12/2021</a:t>
             </a:fld>
             <a:endParaRPr lang="pt-BR"/>
           </a:p>
@@ -2113,7 +2113,7 @@
           <a:p>
             <a:fld id="{FF8DFCC8-87C9-4FC8-94E9-5E6D7726585C}" type="datetimeFigureOut">
               <a:rPr lang="pt-BR" smtClean="0"/>
-              <a:t>12/12/2021</a:t>
+              <a:t>13/12/2021</a:t>
             </a:fld>
             <a:endParaRPr lang="pt-BR"/>
           </a:p>
@@ -2370,7 +2370,7 @@
           <a:p>
             <a:fld id="{FF8DFCC8-87C9-4FC8-94E9-5E6D7726585C}" type="datetimeFigureOut">
               <a:rPr lang="pt-BR" smtClean="0"/>
-              <a:t>12/12/2021</a:t>
+              <a:t>13/12/2021</a:t>
             </a:fld>
             <a:endParaRPr lang="pt-BR"/>
           </a:p>
@@ -2583,7 +2583,7 @@
           <a:p>
             <a:fld id="{FF8DFCC8-87C9-4FC8-94E9-5E6D7726585C}" type="datetimeFigureOut">
               <a:rPr lang="pt-BR" smtClean="0"/>
-              <a:t>12/12/2021</a:t>
+              <a:t>13/12/2021</a:t>
             </a:fld>
             <a:endParaRPr lang="pt-BR"/>
           </a:p>
@@ -16817,7 +16817,7 @@
           <a:p>
             <a:r>
               <a:rPr lang="pt-BR" sz="1000" dirty="0"/>
-              <a:t>(1.1;0.9)</a:t>
+              <a:t>(1.1;1.1)</a:t>
             </a:r>
             <a:endParaRPr lang="pt-BR" sz="1200" dirty="0"/>
           </a:p>
@@ -19582,7 +19582,7 @@
           <a:p>
             <a:r>
               <a:rPr lang="pt-BR" sz="1000" dirty="0"/>
-              <a:t>(1.1;0.9)</a:t>
+              <a:t>(1.1;1.1)</a:t>
             </a:r>
             <a:endParaRPr lang="pt-BR" sz="1200" dirty="0"/>
           </a:p>

</xml_diff>

<commit_message>
Correções na AOO, novos diagramas
</commit_message>
<xml_diff>
--- a/imagens/ppt/desenhos_TCC.pptx
+++ b/imagens/ppt/desenhos_TCC.pptx
@@ -15,6 +15,8 @@
     <p:sldId id="263" r:id="rId9"/>
     <p:sldId id="264" r:id="rId10"/>
     <p:sldId id="265" r:id="rId11"/>
+    <p:sldId id="266" r:id="rId12"/>
+    <p:sldId id="267" r:id="rId13"/>
   </p:sldIdLst>
   <p:sldSz cx="7199313" cy="6858000"/>
   <p:notesSz cx="6858000" cy="9144000"/>
@@ -263,7 +265,7 @@
           <a:p>
             <a:fld id="{FF8DFCC8-87C9-4FC8-94E9-5E6D7726585C}" type="datetimeFigureOut">
               <a:rPr lang="pt-BR" smtClean="0"/>
-              <a:t>06/04/2022</a:t>
+              <a:t>05/05/2022</a:t>
             </a:fld>
             <a:endParaRPr lang="pt-BR"/>
           </a:p>
@@ -433,7 +435,7 @@
           <a:p>
             <a:fld id="{FF8DFCC8-87C9-4FC8-94E9-5E6D7726585C}" type="datetimeFigureOut">
               <a:rPr lang="pt-BR" smtClean="0"/>
-              <a:t>06/04/2022</a:t>
+              <a:t>05/05/2022</a:t>
             </a:fld>
             <a:endParaRPr lang="pt-BR"/>
           </a:p>
@@ -613,7 +615,7 @@
           <a:p>
             <a:fld id="{FF8DFCC8-87C9-4FC8-94E9-5E6D7726585C}" type="datetimeFigureOut">
               <a:rPr lang="pt-BR" smtClean="0"/>
-              <a:t>06/04/2022</a:t>
+              <a:t>05/05/2022</a:t>
             </a:fld>
             <a:endParaRPr lang="pt-BR"/>
           </a:p>
@@ -783,7 +785,7 @@
           <a:p>
             <a:fld id="{FF8DFCC8-87C9-4FC8-94E9-5E6D7726585C}" type="datetimeFigureOut">
               <a:rPr lang="pt-BR" smtClean="0"/>
-              <a:t>06/04/2022</a:t>
+              <a:t>05/05/2022</a:t>
             </a:fld>
             <a:endParaRPr lang="pt-BR"/>
           </a:p>
@@ -1027,7 +1029,7 @@
           <a:p>
             <a:fld id="{FF8DFCC8-87C9-4FC8-94E9-5E6D7726585C}" type="datetimeFigureOut">
               <a:rPr lang="pt-BR" smtClean="0"/>
-              <a:t>06/04/2022</a:t>
+              <a:t>05/05/2022</a:t>
             </a:fld>
             <a:endParaRPr lang="pt-BR"/>
           </a:p>
@@ -1259,7 +1261,7 @@
           <a:p>
             <a:fld id="{FF8DFCC8-87C9-4FC8-94E9-5E6D7726585C}" type="datetimeFigureOut">
               <a:rPr lang="pt-BR" smtClean="0"/>
-              <a:t>06/04/2022</a:t>
+              <a:t>05/05/2022</a:t>
             </a:fld>
             <a:endParaRPr lang="pt-BR"/>
           </a:p>
@@ -1626,7 +1628,7 @@
           <a:p>
             <a:fld id="{FF8DFCC8-87C9-4FC8-94E9-5E6D7726585C}" type="datetimeFigureOut">
               <a:rPr lang="pt-BR" smtClean="0"/>
-              <a:t>06/04/2022</a:t>
+              <a:t>05/05/2022</a:t>
             </a:fld>
             <a:endParaRPr lang="pt-BR"/>
           </a:p>
@@ -1744,7 +1746,7 @@
           <a:p>
             <a:fld id="{FF8DFCC8-87C9-4FC8-94E9-5E6D7726585C}" type="datetimeFigureOut">
               <a:rPr lang="pt-BR" smtClean="0"/>
-              <a:t>06/04/2022</a:t>
+              <a:t>05/05/2022</a:t>
             </a:fld>
             <a:endParaRPr lang="pt-BR"/>
           </a:p>
@@ -1839,7 +1841,7 @@
           <a:p>
             <a:fld id="{FF8DFCC8-87C9-4FC8-94E9-5E6D7726585C}" type="datetimeFigureOut">
               <a:rPr lang="pt-BR" smtClean="0"/>
-              <a:t>06/04/2022</a:t>
+              <a:t>05/05/2022</a:t>
             </a:fld>
             <a:endParaRPr lang="pt-BR"/>
           </a:p>
@@ -2116,7 +2118,7 @@
           <a:p>
             <a:fld id="{FF8DFCC8-87C9-4FC8-94E9-5E6D7726585C}" type="datetimeFigureOut">
               <a:rPr lang="pt-BR" smtClean="0"/>
-              <a:t>06/04/2022</a:t>
+              <a:t>05/05/2022</a:t>
             </a:fld>
             <a:endParaRPr lang="pt-BR"/>
           </a:p>
@@ -2373,7 +2375,7 @@
           <a:p>
             <a:fld id="{FF8DFCC8-87C9-4FC8-94E9-5E6D7726585C}" type="datetimeFigureOut">
               <a:rPr lang="pt-BR" smtClean="0"/>
-              <a:t>06/04/2022</a:t>
+              <a:t>05/05/2022</a:t>
             </a:fld>
             <a:endParaRPr lang="pt-BR"/>
           </a:p>
@@ -2586,7 +2588,7 @@
           <a:p>
             <a:fld id="{FF8DFCC8-87C9-4FC8-94E9-5E6D7726585C}" type="datetimeFigureOut">
               <a:rPr lang="pt-BR" smtClean="0"/>
-              <a:t>06/04/2022</a:t>
+              <a:t>05/05/2022</a:t>
             </a:fld>
             <a:endParaRPr lang="pt-BR"/>
           </a:p>
@@ -5271,6 +5273,3796 @@
     <p:extLst>
       <p:ext uri="{BB962C8B-B14F-4D97-AF65-F5344CB8AC3E}">
         <p14:creationId xmlns:p14="http://schemas.microsoft.com/office/powerpoint/2010/main" val="173018023"/>
+      </p:ext>
+    </p:extLst>
+  </p:cSld>
+  <p:clrMapOvr>
+    <a:masterClrMapping/>
+  </p:clrMapOvr>
+</p:sld>
+</file>
+
+<file path=ppt/slides/slide11.xml><?xml version="1.0" encoding="utf-8"?>
+<p:sld xmlns:a="http://schemas.openxmlformats.org/drawingml/2006/main" xmlns:r="http://schemas.openxmlformats.org/officeDocument/2006/relationships" xmlns:p="http://schemas.openxmlformats.org/presentationml/2006/main">
+  <p:cSld>
+    <p:spTree>
+      <p:nvGrpSpPr>
+        <p:cNvPr id="1" name=""/>
+        <p:cNvGrpSpPr/>
+        <p:nvPr/>
+      </p:nvGrpSpPr>
+      <p:grpSpPr>
+        <a:xfrm>
+          <a:off x="0" y="0"/>
+          <a:ext cx="0" cy="0"/>
+          <a:chOff x="0" y="0"/>
+          <a:chExt cx="0" cy="0"/>
+        </a:xfrm>
+      </p:grpSpPr>
+      <p:sp>
+        <p:nvSpPr>
+          <p:cNvPr id="4" name="Retângulo 3">
+            <a:extLst>
+              <a:ext uri="{FF2B5EF4-FFF2-40B4-BE49-F238E27FC236}">
+                <a16:creationId xmlns:a16="http://schemas.microsoft.com/office/drawing/2014/main" id="{003499EE-0A8C-2622-7900-2AFCB5E91588}"/>
+              </a:ext>
+            </a:extLst>
+          </p:cNvPr>
+          <p:cNvSpPr/>
+          <p:nvPr/>
+        </p:nvSpPr>
+        <p:spPr>
+          <a:xfrm>
+            <a:off x="232898" y="2032031"/>
+            <a:ext cx="1235973" cy="750114"/>
+          </a:xfrm>
+          <a:prstGeom prst="rect">
+            <a:avLst/>
+          </a:prstGeom>
+        </p:spPr>
+        <p:style>
+          <a:lnRef idx="2">
+            <a:schemeClr val="accent1">
+              <a:shade val="50000"/>
+            </a:schemeClr>
+          </a:lnRef>
+          <a:fillRef idx="1">
+            <a:schemeClr val="accent1"/>
+          </a:fillRef>
+          <a:effectRef idx="0">
+            <a:schemeClr val="accent1"/>
+          </a:effectRef>
+          <a:fontRef idx="minor">
+            <a:schemeClr val="lt1"/>
+          </a:fontRef>
+        </p:style>
+        <p:txBody>
+          <a:bodyPr rtlCol="0" anchor="ctr"/>
+          <a:lstStyle/>
+          <a:p>
+            <a:pPr algn="ctr"/>
+            <a:endParaRPr lang="pt-BR" dirty="0"/>
+          </a:p>
+        </p:txBody>
+      </p:sp>
+      <p:sp>
+        <p:nvSpPr>
+          <p:cNvPr id="5" name="Retângulo 4">
+            <a:extLst>
+              <a:ext uri="{FF2B5EF4-FFF2-40B4-BE49-F238E27FC236}">
+                <a16:creationId xmlns:a16="http://schemas.microsoft.com/office/drawing/2014/main" id="{33102406-B7F4-EA39-85E8-FA3683FDAE32}"/>
+              </a:ext>
+            </a:extLst>
+          </p:cNvPr>
+          <p:cNvSpPr/>
+          <p:nvPr/>
+        </p:nvSpPr>
+        <p:spPr>
+          <a:xfrm>
+            <a:off x="2248544" y="2067497"/>
+            <a:ext cx="112203" cy="648238"/>
+          </a:xfrm>
+          <a:prstGeom prst="rect">
+            <a:avLst/>
+          </a:prstGeom>
+        </p:spPr>
+        <p:style>
+          <a:lnRef idx="2">
+            <a:schemeClr val="accent1">
+              <a:shade val="50000"/>
+            </a:schemeClr>
+          </a:lnRef>
+          <a:fillRef idx="1">
+            <a:schemeClr val="accent1"/>
+          </a:fillRef>
+          <a:effectRef idx="0">
+            <a:schemeClr val="accent1"/>
+          </a:effectRef>
+          <a:fontRef idx="minor">
+            <a:schemeClr val="lt1"/>
+          </a:fontRef>
+        </p:style>
+        <p:txBody>
+          <a:bodyPr rtlCol="0" anchor="ctr"/>
+          <a:lstStyle/>
+          <a:p>
+            <a:pPr algn="ctr"/>
+            <a:endParaRPr lang="pt-BR"/>
+          </a:p>
+        </p:txBody>
+      </p:sp>
+      <p:sp>
+        <p:nvSpPr>
+          <p:cNvPr id="6" name="Retângulo 5">
+            <a:extLst>
+              <a:ext uri="{FF2B5EF4-FFF2-40B4-BE49-F238E27FC236}">
+                <a16:creationId xmlns:a16="http://schemas.microsoft.com/office/drawing/2014/main" id="{A0E6D889-97A3-3BEF-23F1-70FA9E94CF04}"/>
+              </a:ext>
+            </a:extLst>
+          </p:cNvPr>
+          <p:cNvSpPr/>
+          <p:nvPr/>
+        </p:nvSpPr>
+        <p:spPr>
+          <a:xfrm>
+            <a:off x="2477107" y="2067497"/>
+            <a:ext cx="112202" cy="648238"/>
+          </a:xfrm>
+          <a:prstGeom prst="rect">
+            <a:avLst/>
+          </a:prstGeom>
+        </p:spPr>
+        <p:style>
+          <a:lnRef idx="2">
+            <a:schemeClr val="accent1">
+              <a:shade val="50000"/>
+            </a:schemeClr>
+          </a:lnRef>
+          <a:fillRef idx="1">
+            <a:schemeClr val="accent1"/>
+          </a:fillRef>
+          <a:effectRef idx="0">
+            <a:schemeClr val="accent1"/>
+          </a:effectRef>
+          <a:fontRef idx="minor">
+            <a:schemeClr val="lt1"/>
+          </a:fontRef>
+        </p:style>
+        <p:txBody>
+          <a:bodyPr rtlCol="0" anchor="ctr"/>
+          <a:lstStyle/>
+          <a:p>
+            <a:pPr algn="ctr"/>
+            <a:endParaRPr lang="pt-BR"/>
+          </a:p>
+        </p:txBody>
+      </p:sp>
+      <p:sp>
+        <p:nvSpPr>
+          <p:cNvPr id="7" name="Retângulo 6">
+            <a:extLst>
+              <a:ext uri="{FF2B5EF4-FFF2-40B4-BE49-F238E27FC236}">
+                <a16:creationId xmlns:a16="http://schemas.microsoft.com/office/drawing/2014/main" id="{2714C558-0AA1-C00E-3252-A34720EF1BD4}"/>
+              </a:ext>
+            </a:extLst>
+          </p:cNvPr>
+          <p:cNvSpPr/>
+          <p:nvPr/>
+        </p:nvSpPr>
+        <p:spPr>
+          <a:xfrm>
+            <a:off x="2705669" y="2067497"/>
+            <a:ext cx="112202" cy="648238"/>
+          </a:xfrm>
+          <a:prstGeom prst="rect">
+            <a:avLst/>
+          </a:prstGeom>
+        </p:spPr>
+        <p:style>
+          <a:lnRef idx="2">
+            <a:schemeClr val="accent1">
+              <a:shade val="50000"/>
+            </a:schemeClr>
+          </a:lnRef>
+          <a:fillRef idx="1">
+            <a:schemeClr val="accent1"/>
+          </a:fillRef>
+          <a:effectRef idx="0">
+            <a:schemeClr val="accent1"/>
+          </a:effectRef>
+          <a:fontRef idx="minor">
+            <a:schemeClr val="lt1"/>
+          </a:fontRef>
+        </p:style>
+        <p:txBody>
+          <a:bodyPr rtlCol="0" anchor="ctr"/>
+          <a:lstStyle/>
+          <a:p>
+            <a:pPr algn="ctr"/>
+            <a:endParaRPr lang="pt-BR"/>
+          </a:p>
+        </p:txBody>
+      </p:sp>
+      <p:sp>
+        <p:nvSpPr>
+          <p:cNvPr id="8" name="Retângulo 7">
+            <a:extLst>
+              <a:ext uri="{FF2B5EF4-FFF2-40B4-BE49-F238E27FC236}">
+                <a16:creationId xmlns:a16="http://schemas.microsoft.com/office/drawing/2014/main" id="{1E1BD104-96E6-63AC-DB44-E93BA2A354EA}"/>
+              </a:ext>
+            </a:extLst>
+          </p:cNvPr>
+          <p:cNvSpPr/>
+          <p:nvPr/>
+        </p:nvSpPr>
+        <p:spPr>
+          <a:xfrm>
+            <a:off x="2934231" y="2067497"/>
+            <a:ext cx="112202" cy="648238"/>
+          </a:xfrm>
+          <a:prstGeom prst="rect">
+            <a:avLst/>
+          </a:prstGeom>
+        </p:spPr>
+        <p:style>
+          <a:lnRef idx="2">
+            <a:schemeClr val="accent1">
+              <a:shade val="50000"/>
+            </a:schemeClr>
+          </a:lnRef>
+          <a:fillRef idx="1">
+            <a:schemeClr val="accent1"/>
+          </a:fillRef>
+          <a:effectRef idx="0">
+            <a:schemeClr val="accent1"/>
+          </a:effectRef>
+          <a:fontRef idx="minor">
+            <a:schemeClr val="lt1"/>
+          </a:fontRef>
+        </p:style>
+        <p:txBody>
+          <a:bodyPr rtlCol="0" anchor="ctr"/>
+          <a:lstStyle/>
+          <a:p>
+            <a:pPr algn="ctr"/>
+            <a:endParaRPr lang="pt-BR"/>
+          </a:p>
+        </p:txBody>
+      </p:sp>
+      <p:sp>
+        <p:nvSpPr>
+          <p:cNvPr id="9" name="Retângulo 8">
+            <a:extLst>
+              <a:ext uri="{FF2B5EF4-FFF2-40B4-BE49-F238E27FC236}">
+                <a16:creationId xmlns:a16="http://schemas.microsoft.com/office/drawing/2014/main" id="{02F29076-D1E9-9491-8885-E505C4C65823}"/>
+              </a:ext>
+            </a:extLst>
+          </p:cNvPr>
+          <p:cNvSpPr/>
+          <p:nvPr/>
+        </p:nvSpPr>
+        <p:spPr>
+          <a:xfrm>
+            <a:off x="3162793" y="2067497"/>
+            <a:ext cx="112202" cy="648238"/>
+          </a:xfrm>
+          <a:prstGeom prst="rect">
+            <a:avLst/>
+          </a:prstGeom>
+        </p:spPr>
+        <p:style>
+          <a:lnRef idx="2">
+            <a:schemeClr val="accent1">
+              <a:shade val="50000"/>
+            </a:schemeClr>
+          </a:lnRef>
+          <a:fillRef idx="1">
+            <a:schemeClr val="accent1"/>
+          </a:fillRef>
+          <a:effectRef idx="0">
+            <a:schemeClr val="accent1"/>
+          </a:effectRef>
+          <a:fontRef idx="minor">
+            <a:schemeClr val="lt1"/>
+          </a:fontRef>
+        </p:style>
+        <p:txBody>
+          <a:bodyPr rtlCol="0" anchor="ctr"/>
+          <a:lstStyle/>
+          <a:p>
+            <a:pPr algn="ctr"/>
+            <a:endParaRPr lang="pt-BR"/>
+          </a:p>
+        </p:txBody>
+      </p:sp>
+      <p:sp>
+        <p:nvSpPr>
+          <p:cNvPr id="10" name="Retângulo 9">
+            <a:extLst>
+              <a:ext uri="{FF2B5EF4-FFF2-40B4-BE49-F238E27FC236}">
+                <a16:creationId xmlns:a16="http://schemas.microsoft.com/office/drawing/2014/main" id="{766504FE-80F4-83EF-D522-A43DED040D48}"/>
+              </a:ext>
+            </a:extLst>
+          </p:cNvPr>
+          <p:cNvSpPr/>
+          <p:nvPr/>
+        </p:nvSpPr>
+        <p:spPr>
+          <a:xfrm>
+            <a:off x="3391355" y="2067497"/>
+            <a:ext cx="112202" cy="648238"/>
+          </a:xfrm>
+          <a:prstGeom prst="rect">
+            <a:avLst/>
+          </a:prstGeom>
+        </p:spPr>
+        <p:style>
+          <a:lnRef idx="2">
+            <a:schemeClr val="accent1">
+              <a:shade val="50000"/>
+            </a:schemeClr>
+          </a:lnRef>
+          <a:fillRef idx="1">
+            <a:schemeClr val="accent1"/>
+          </a:fillRef>
+          <a:effectRef idx="0">
+            <a:schemeClr val="accent1"/>
+          </a:effectRef>
+          <a:fontRef idx="minor">
+            <a:schemeClr val="lt1"/>
+          </a:fontRef>
+        </p:style>
+        <p:txBody>
+          <a:bodyPr rtlCol="0" anchor="ctr"/>
+          <a:lstStyle/>
+          <a:p>
+            <a:pPr algn="ctr"/>
+            <a:endParaRPr lang="pt-BR"/>
+          </a:p>
+        </p:txBody>
+      </p:sp>
+      <p:sp>
+        <p:nvSpPr>
+          <p:cNvPr id="11" name="Retângulo 10">
+            <a:extLst>
+              <a:ext uri="{FF2B5EF4-FFF2-40B4-BE49-F238E27FC236}">
+                <a16:creationId xmlns:a16="http://schemas.microsoft.com/office/drawing/2014/main" id="{387C6E13-1559-A973-54EB-5ABBF8FC1176}"/>
+              </a:ext>
+            </a:extLst>
+          </p:cNvPr>
+          <p:cNvSpPr/>
+          <p:nvPr/>
+        </p:nvSpPr>
+        <p:spPr>
+          <a:xfrm>
+            <a:off x="3619917" y="2067497"/>
+            <a:ext cx="112202" cy="648238"/>
+          </a:xfrm>
+          <a:prstGeom prst="rect">
+            <a:avLst/>
+          </a:prstGeom>
+        </p:spPr>
+        <p:style>
+          <a:lnRef idx="2">
+            <a:schemeClr val="accent1">
+              <a:shade val="50000"/>
+            </a:schemeClr>
+          </a:lnRef>
+          <a:fillRef idx="1">
+            <a:schemeClr val="accent1"/>
+          </a:fillRef>
+          <a:effectRef idx="0">
+            <a:schemeClr val="accent1"/>
+          </a:effectRef>
+          <a:fontRef idx="minor">
+            <a:schemeClr val="lt1"/>
+          </a:fontRef>
+        </p:style>
+        <p:txBody>
+          <a:bodyPr rtlCol="0" anchor="ctr"/>
+          <a:lstStyle/>
+          <a:p>
+            <a:pPr algn="ctr"/>
+            <a:endParaRPr lang="pt-BR"/>
+          </a:p>
+        </p:txBody>
+      </p:sp>
+      <p:sp>
+        <p:nvSpPr>
+          <p:cNvPr id="12" name="Retângulo 11">
+            <a:extLst>
+              <a:ext uri="{FF2B5EF4-FFF2-40B4-BE49-F238E27FC236}">
+                <a16:creationId xmlns:a16="http://schemas.microsoft.com/office/drawing/2014/main" id="{67421ED2-2D4A-42E0-22A3-CF2E9095BEA3}"/>
+              </a:ext>
+            </a:extLst>
+          </p:cNvPr>
+          <p:cNvSpPr/>
+          <p:nvPr/>
+        </p:nvSpPr>
+        <p:spPr>
+          <a:xfrm>
+            <a:off x="3848477" y="2067497"/>
+            <a:ext cx="112202" cy="648238"/>
+          </a:xfrm>
+          <a:prstGeom prst="rect">
+            <a:avLst/>
+          </a:prstGeom>
+        </p:spPr>
+        <p:style>
+          <a:lnRef idx="2">
+            <a:schemeClr val="accent1">
+              <a:shade val="50000"/>
+            </a:schemeClr>
+          </a:lnRef>
+          <a:fillRef idx="1">
+            <a:schemeClr val="accent1"/>
+          </a:fillRef>
+          <a:effectRef idx="0">
+            <a:schemeClr val="accent1"/>
+          </a:effectRef>
+          <a:fontRef idx="minor">
+            <a:schemeClr val="lt1"/>
+          </a:fontRef>
+        </p:style>
+        <p:txBody>
+          <a:bodyPr rtlCol="0" anchor="ctr"/>
+          <a:lstStyle/>
+          <a:p>
+            <a:pPr algn="ctr"/>
+            <a:endParaRPr lang="pt-BR"/>
+          </a:p>
+        </p:txBody>
+      </p:sp>
+      <p:sp>
+        <p:nvSpPr>
+          <p:cNvPr id="13" name="Retângulo 12">
+            <a:extLst>
+              <a:ext uri="{FF2B5EF4-FFF2-40B4-BE49-F238E27FC236}">
+                <a16:creationId xmlns:a16="http://schemas.microsoft.com/office/drawing/2014/main" id="{43CEE69A-8DCC-9577-69C8-19C5D74FAF43}"/>
+              </a:ext>
+            </a:extLst>
+          </p:cNvPr>
+          <p:cNvSpPr/>
+          <p:nvPr/>
+        </p:nvSpPr>
+        <p:spPr>
+          <a:xfrm>
+            <a:off x="4173795" y="2067497"/>
+            <a:ext cx="112202" cy="648238"/>
+          </a:xfrm>
+          <a:prstGeom prst="rect">
+            <a:avLst/>
+          </a:prstGeom>
+        </p:spPr>
+        <p:style>
+          <a:lnRef idx="2">
+            <a:schemeClr val="accent1">
+              <a:shade val="50000"/>
+            </a:schemeClr>
+          </a:lnRef>
+          <a:fillRef idx="1">
+            <a:schemeClr val="accent1"/>
+          </a:fillRef>
+          <a:effectRef idx="0">
+            <a:schemeClr val="accent1"/>
+          </a:effectRef>
+          <a:fontRef idx="minor">
+            <a:schemeClr val="lt1"/>
+          </a:fontRef>
+        </p:style>
+        <p:txBody>
+          <a:bodyPr rtlCol="0" anchor="ctr"/>
+          <a:lstStyle/>
+          <a:p>
+            <a:pPr algn="ctr"/>
+            <a:endParaRPr lang="pt-BR"/>
+          </a:p>
+        </p:txBody>
+      </p:sp>
+      <p:sp>
+        <p:nvSpPr>
+          <p:cNvPr id="14" name="Retângulo 13">
+            <a:extLst>
+              <a:ext uri="{FF2B5EF4-FFF2-40B4-BE49-F238E27FC236}">
+                <a16:creationId xmlns:a16="http://schemas.microsoft.com/office/drawing/2014/main" id="{F027B751-A161-37A3-48DF-9FABFD3D46EB}"/>
+              </a:ext>
+            </a:extLst>
+          </p:cNvPr>
+          <p:cNvSpPr/>
+          <p:nvPr/>
+        </p:nvSpPr>
+        <p:spPr>
+          <a:xfrm>
+            <a:off x="4604282" y="2067497"/>
+            <a:ext cx="112202" cy="648238"/>
+          </a:xfrm>
+          <a:prstGeom prst="rect">
+            <a:avLst/>
+          </a:prstGeom>
+        </p:spPr>
+        <p:style>
+          <a:lnRef idx="2">
+            <a:schemeClr val="accent1">
+              <a:shade val="50000"/>
+            </a:schemeClr>
+          </a:lnRef>
+          <a:fillRef idx="1">
+            <a:schemeClr val="accent1"/>
+          </a:fillRef>
+          <a:effectRef idx="0">
+            <a:schemeClr val="accent1"/>
+          </a:effectRef>
+          <a:fontRef idx="minor">
+            <a:schemeClr val="lt1"/>
+          </a:fontRef>
+        </p:style>
+        <p:txBody>
+          <a:bodyPr rtlCol="0" anchor="ctr"/>
+          <a:lstStyle/>
+          <a:p>
+            <a:pPr algn="ctr"/>
+            <a:endParaRPr lang="pt-BR"/>
+          </a:p>
+        </p:txBody>
+      </p:sp>
+      <p:sp>
+        <p:nvSpPr>
+          <p:cNvPr id="18" name="Seta: para Baixo 17">
+            <a:extLst>
+              <a:ext uri="{FF2B5EF4-FFF2-40B4-BE49-F238E27FC236}">
+                <a16:creationId xmlns:a16="http://schemas.microsoft.com/office/drawing/2014/main" id="{C6CA878B-DC54-C617-76A3-24547C59571E}"/>
+              </a:ext>
+            </a:extLst>
+          </p:cNvPr>
+          <p:cNvSpPr/>
+          <p:nvPr/>
+        </p:nvSpPr>
+        <p:spPr>
+          <a:xfrm rot="16200000">
+            <a:off x="1805110" y="2190084"/>
+            <a:ext cx="189261" cy="423259"/>
+          </a:xfrm>
+          <a:prstGeom prst="downArrow">
+            <a:avLst>
+              <a:gd name="adj1" fmla="val 27390"/>
+              <a:gd name="adj2" fmla="val 68841"/>
+            </a:avLst>
+          </a:prstGeom>
+          <a:solidFill>
+            <a:schemeClr val="tx1"/>
+          </a:solidFill>
+          <a:ln>
+            <a:solidFill>
+              <a:schemeClr val="tx1"/>
+            </a:solidFill>
+          </a:ln>
+        </p:spPr>
+        <p:style>
+          <a:lnRef idx="2">
+            <a:schemeClr val="accent1">
+              <a:shade val="50000"/>
+            </a:schemeClr>
+          </a:lnRef>
+          <a:fillRef idx="1">
+            <a:schemeClr val="accent1"/>
+          </a:fillRef>
+          <a:effectRef idx="0">
+            <a:schemeClr val="accent1"/>
+          </a:effectRef>
+          <a:fontRef idx="minor">
+            <a:schemeClr val="lt1"/>
+          </a:fontRef>
+        </p:style>
+        <p:txBody>
+          <a:bodyPr rtlCol="0" anchor="ctr"/>
+          <a:lstStyle/>
+          <a:p>
+            <a:pPr algn="ctr"/>
+            <a:endParaRPr lang="pt-BR"/>
+          </a:p>
+        </p:txBody>
+      </p:sp>
+      <p:sp>
+        <p:nvSpPr>
+          <p:cNvPr id="20" name="Retângulo 19">
+            <a:extLst>
+              <a:ext uri="{FF2B5EF4-FFF2-40B4-BE49-F238E27FC236}">
+                <a16:creationId xmlns:a16="http://schemas.microsoft.com/office/drawing/2014/main" id="{A72F8819-9BF6-769D-72B2-241A1F212D0B}"/>
+              </a:ext>
+            </a:extLst>
+          </p:cNvPr>
+          <p:cNvSpPr/>
+          <p:nvPr/>
+        </p:nvSpPr>
+        <p:spPr>
+          <a:xfrm>
+            <a:off x="5577840" y="2067497"/>
+            <a:ext cx="1546166" cy="648238"/>
+          </a:xfrm>
+          <a:prstGeom prst="rect">
+            <a:avLst/>
+          </a:prstGeom>
+          <a:solidFill>
+            <a:schemeClr val="accent2">
+              <a:lumMod val="75000"/>
+            </a:schemeClr>
+          </a:solidFill>
+          <a:ln>
+            <a:solidFill>
+              <a:schemeClr val="accent2">
+                <a:lumMod val="20000"/>
+                <a:lumOff val="80000"/>
+              </a:schemeClr>
+            </a:solidFill>
+          </a:ln>
+        </p:spPr>
+        <p:style>
+          <a:lnRef idx="2">
+            <a:schemeClr val="accent1">
+              <a:shade val="50000"/>
+            </a:schemeClr>
+          </a:lnRef>
+          <a:fillRef idx="1">
+            <a:schemeClr val="accent1"/>
+          </a:fillRef>
+          <a:effectRef idx="0">
+            <a:schemeClr val="accent1"/>
+          </a:effectRef>
+          <a:fontRef idx="minor">
+            <a:schemeClr val="lt1"/>
+          </a:fontRef>
+        </p:style>
+        <p:txBody>
+          <a:bodyPr rtlCol="0" anchor="ctr"/>
+          <a:lstStyle/>
+          <a:p>
+            <a:pPr algn="ctr"/>
+            <a:r>
+              <a:rPr lang="pt-BR" dirty="0"/>
+              <a:t>Processador</a:t>
+            </a:r>
+          </a:p>
+        </p:txBody>
+      </p:sp>
+      <p:sp>
+        <p:nvSpPr>
+          <p:cNvPr id="21" name="CaixaDeTexto 20">
+            <a:extLst>
+              <a:ext uri="{FF2B5EF4-FFF2-40B4-BE49-F238E27FC236}">
+                <a16:creationId xmlns:a16="http://schemas.microsoft.com/office/drawing/2014/main" id="{2E77C772-8980-CD8B-2CF3-54CCA1FD223C}"/>
+              </a:ext>
+            </a:extLst>
+          </p:cNvPr>
+          <p:cNvSpPr txBox="1"/>
+          <p:nvPr/>
+        </p:nvSpPr>
+        <p:spPr>
+          <a:xfrm>
+            <a:off x="2480177" y="1698165"/>
+            <a:ext cx="1153201" cy="369332"/>
+          </a:xfrm>
+          <a:prstGeom prst="rect">
+            <a:avLst/>
+          </a:prstGeom>
+          <a:noFill/>
+        </p:spPr>
+        <p:txBody>
+          <a:bodyPr wrap="none" rtlCol="0">
+            <a:spAutoFit/>
+          </a:bodyPr>
+          <a:lstStyle/>
+          <a:p>
+            <a:r>
+              <a:rPr lang="pt-BR" dirty="0"/>
+              <a:t>Instruções</a:t>
+            </a:r>
+          </a:p>
+        </p:txBody>
+      </p:sp>
+      <p:sp>
+        <p:nvSpPr>
+          <p:cNvPr id="22" name="CaixaDeTexto 21">
+            <a:extLst>
+              <a:ext uri="{FF2B5EF4-FFF2-40B4-BE49-F238E27FC236}">
+                <a16:creationId xmlns:a16="http://schemas.microsoft.com/office/drawing/2014/main" id="{BA7D6C83-C596-F9B6-82FF-0CD70D83FEAF}"/>
+              </a:ext>
+            </a:extLst>
+          </p:cNvPr>
+          <p:cNvSpPr txBox="1"/>
+          <p:nvPr/>
+        </p:nvSpPr>
+        <p:spPr>
+          <a:xfrm>
+            <a:off x="2099300" y="5069765"/>
+            <a:ext cx="410690" cy="369332"/>
+          </a:xfrm>
+          <a:prstGeom prst="rect">
+            <a:avLst/>
+          </a:prstGeom>
+          <a:noFill/>
+        </p:spPr>
+        <p:txBody>
+          <a:bodyPr wrap="none" rtlCol="0">
+            <a:spAutoFit/>
+          </a:bodyPr>
+          <a:lstStyle/>
+          <a:p>
+            <a:r>
+              <a:rPr lang="pt-BR" dirty="0" err="1"/>
+              <a:t>tN</a:t>
+            </a:r>
+            <a:endParaRPr lang="pt-BR" dirty="0"/>
+          </a:p>
+        </p:txBody>
+      </p:sp>
+      <p:sp>
+        <p:nvSpPr>
+          <p:cNvPr id="23" name="CaixaDeTexto 22">
+            <a:extLst>
+              <a:ext uri="{FF2B5EF4-FFF2-40B4-BE49-F238E27FC236}">
+                <a16:creationId xmlns:a16="http://schemas.microsoft.com/office/drawing/2014/main" id="{C63A4C98-FB8D-819E-7961-267B4CD41EB7}"/>
+              </a:ext>
+            </a:extLst>
+          </p:cNvPr>
+          <p:cNvSpPr txBox="1"/>
+          <p:nvPr/>
+        </p:nvSpPr>
+        <p:spPr>
+          <a:xfrm>
+            <a:off x="4471068" y="5069765"/>
+            <a:ext cx="378630" cy="369332"/>
+          </a:xfrm>
+          <a:prstGeom prst="rect">
+            <a:avLst/>
+          </a:prstGeom>
+          <a:noFill/>
+        </p:spPr>
+        <p:txBody>
+          <a:bodyPr wrap="none" rtlCol="0">
+            <a:spAutoFit/>
+          </a:bodyPr>
+          <a:lstStyle/>
+          <a:p>
+            <a:r>
+              <a:rPr lang="pt-BR" dirty="0"/>
+              <a:t>t1</a:t>
+            </a:r>
+          </a:p>
+        </p:txBody>
+      </p:sp>
+      <p:sp>
+        <p:nvSpPr>
+          <p:cNvPr id="24" name="CaixaDeTexto 23">
+            <a:extLst>
+              <a:ext uri="{FF2B5EF4-FFF2-40B4-BE49-F238E27FC236}">
+                <a16:creationId xmlns:a16="http://schemas.microsoft.com/office/drawing/2014/main" id="{24D70D8B-4052-08F8-58A0-C01FD56E6480}"/>
+              </a:ext>
+            </a:extLst>
+          </p:cNvPr>
+          <p:cNvSpPr txBox="1"/>
+          <p:nvPr/>
+        </p:nvSpPr>
+        <p:spPr>
+          <a:xfrm>
+            <a:off x="4040581" y="5069765"/>
+            <a:ext cx="378630" cy="369332"/>
+          </a:xfrm>
+          <a:prstGeom prst="rect">
+            <a:avLst/>
+          </a:prstGeom>
+          <a:noFill/>
+        </p:spPr>
+        <p:txBody>
+          <a:bodyPr wrap="none" rtlCol="0">
+            <a:spAutoFit/>
+          </a:bodyPr>
+          <a:lstStyle/>
+          <a:p>
+            <a:r>
+              <a:rPr lang="pt-BR" dirty="0"/>
+              <a:t>t2</a:t>
+            </a:r>
+          </a:p>
+        </p:txBody>
+      </p:sp>
+      <p:sp>
+        <p:nvSpPr>
+          <p:cNvPr id="26" name="Seta: para Baixo 25">
+            <a:extLst>
+              <a:ext uri="{FF2B5EF4-FFF2-40B4-BE49-F238E27FC236}">
+                <a16:creationId xmlns:a16="http://schemas.microsoft.com/office/drawing/2014/main" id="{66717F3A-4FEF-8574-FD38-2D91F4A597DB}"/>
+              </a:ext>
+            </a:extLst>
+          </p:cNvPr>
+          <p:cNvSpPr/>
+          <p:nvPr/>
+        </p:nvSpPr>
+        <p:spPr>
+          <a:xfrm rot="16200000">
+            <a:off x="5052722" y="2190084"/>
+            <a:ext cx="189261" cy="423259"/>
+          </a:xfrm>
+          <a:prstGeom prst="downArrow">
+            <a:avLst>
+              <a:gd name="adj1" fmla="val 27390"/>
+              <a:gd name="adj2" fmla="val 68841"/>
+            </a:avLst>
+          </a:prstGeom>
+          <a:solidFill>
+            <a:schemeClr val="tx1"/>
+          </a:solidFill>
+          <a:ln>
+            <a:solidFill>
+              <a:schemeClr val="tx1"/>
+            </a:solidFill>
+          </a:ln>
+        </p:spPr>
+        <p:style>
+          <a:lnRef idx="2">
+            <a:schemeClr val="accent1">
+              <a:shade val="50000"/>
+            </a:schemeClr>
+          </a:lnRef>
+          <a:fillRef idx="1">
+            <a:schemeClr val="accent1"/>
+          </a:fillRef>
+          <a:effectRef idx="0">
+            <a:schemeClr val="accent1"/>
+          </a:effectRef>
+          <a:fontRef idx="minor">
+            <a:schemeClr val="lt1"/>
+          </a:fontRef>
+        </p:style>
+        <p:txBody>
+          <a:bodyPr rtlCol="0" anchor="ctr"/>
+          <a:lstStyle/>
+          <a:p>
+            <a:pPr algn="ctr"/>
+            <a:endParaRPr lang="pt-BR"/>
+          </a:p>
+        </p:txBody>
+      </p:sp>
+      <p:sp>
+        <p:nvSpPr>
+          <p:cNvPr id="27" name="CaixaDeTexto 26">
+            <a:extLst>
+              <a:ext uri="{FF2B5EF4-FFF2-40B4-BE49-F238E27FC236}">
+                <a16:creationId xmlns:a16="http://schemas.microsoft.com/office/drawing/2014/main" id="{45FB1B0F-F3D5-1235-BDBF-9E40AB706699}"/>
+              </a:ext>
+            </a:extLst>
+          </p:cNvPr>
+          <p:cNvSpPr txBox="1"/>
+          <p:nvPr/>
+        </p:nvSpPr>
+        <p:spPr>
+          <a:xfrm>
+            <a:off x="189223" y="1698165"/>
+            <a:ext cx="1086644" cy="369332"/>
+          </a:xfrm>
+          <a:prstGeom prst="rect">
+            <a:avLst/>
+          </a:prstGeom>
+          <a:noFill/>
+        </p:spPr>
+        <p:txBody>
+          <a:bodyPr wrap="none" rtlCol="0">
+            <a:spAutoFit/>
+          </a:bodyPr>
+          <a:lstStyle/>
+          <a:p>
+            <a:r>
+              <a:rPr lang="pt-BR" dirty="0"/>
+              <a:t>Problema</a:t>
+            </a:r>
+          </a:p>
+        </p:txBody>
+      </p:sp>
+      <p:sp>
+        <p:nvSpPr>
+          <p:cNvPr id="57" name="Retângulo 56">
+            <a:extLst>
+              <a:ext uri="{FF2B5EF4-FFF2-40B4-BE49-F238E27FC236}">
+                <a16:creationId xmlns:a16="http://schemas.microsoft.com/office/drawing/2014/main" id="{49E9E395-72EF-923E-1EBA-3B088CF3DC08}"/>
+              </a:ext>
+            </a:extLst>
+          </p:cNvPr>
+          <p:cNvSpPr/>
+          <p:nvPr/>
+        </p:nvSpPr>
+        <p:spPr>
+          <a:xfrm>
+            <a:off x="2248544" y="2837808"/>
+            <a:ext cx="112203" cy="648238"/>
+          </a:xfrm>
+          <a:prstGeom prst="rect">
+            <a:avLst/>
+          </a:prstGeom>
+        </p:spPr>
+        <p:style>
+          <a:lnRef idx="2">
+            <a:schemeClr val="accent1">
+              <a:shade val="50000"/>
+            </a:schemeClr>
+          </a:lnRef>
+          <a:fillRef idx="1">
+            <a:schemeClr val="accent1"/>
+          </a:fillRef>
+          <a:effectRef idx="0">
+            <a:schemeClr val="accent1"/>
+          </a:effectRef>
+          <a:fontRef idx="minor">
+            <a:schemeClr val="lt1"/>
+          </a:fontRef>
+        </p:style>
+        <p:txBody>
+          <a:bodyPr rtlCol="0" anchor="ctr"/>
+          <a:lstStyle/>
+          <a:p>
+            <a:pPr algn="ctr"/>
+            <a:endParaRPr lang="pt-BR"/>
+          </a:p>
+        </p:txBody>
+      </p:sp>
+      <p:sp>
+        <p:nvSpPr>
+          <p:cNvPr id="58" name="Retângulo 57">
+            <a:extLst>
+              <a:ext uri="{FF2B5EF4-FFF2-40B4-BE49-F238E27FC236}">
+                <a16:creationId xmlns:a16="http://schemas.microsoft.com/office/drawing/2014/main" id="{63B13EB3-E00E-5139-FFA2-F61457F8DECC}"/>
+              </a:ext>
+            </a:extLst>
+          </p:cNvPr>
+          <p:cNvSpPr/>
+          <p:nvPr/>
+        </p:nvSpPr>
+        <p:spPr>
+          <a:xfrm>
+            <a:off x="2477107" y="2837808"/>
+            <a:ext cx="112202" cy="648238"/>
+          </a:xfrm>
+          <a:prstGeom prst="rect">
+            <a:avLst/>
+          </a:prstGeom>
+        </p:spPr>
+        <p:style>
+          <a:lnRef idx="2">
+            <a:schemeClr val="accent1">
+              <a:shade val="50000"/>
+            </a:schemeClr>
+          </a:lnRef>
+          <a:fillRef idx="1">
+            <a:schemeClr val="accent1"/>
+          </a:fillRef>
+          <a:effectRef idx="0">
+            <a:schemeClr val="accent1"/>
+          </a:effectRef>
+          <a:fontRef idx="minor">
+            <a:schemeClr val="lt1"/>
+          </a:fontRef>
+        </p:style>
+        <p:txBody>
+          <a:bodyPr rtlCol="0" anchor="ctr"/>
+          <a:lstStyle/>
+          <a:p>
+            <a:pPr algn="ctr"/>
+            <a:endParaRPr lang="pt-BR"/>
+          </a:p>
+        </p:txBody>
+      </p:sp>
+      <p:sp>
+        <p:nvSpPr>
+          <p:cNvPr id="59" name="Retângulo 58">
+            <a:extLst>
+              <a:ext uri="{FF2B5EF4-FFF2-40B4-BE49-F238E27FC236}">
+                <a16:creationId xmlns:a16="http://schemas.microsoft.com/office/drawing/2014/main" id="{0059A727-0B0D-FD99-2141-8EE84BEC4970}"/>
+              </a:ext>
+            </a:extLst>
+          </p:cNvPr>
+          <p:cNvSpPr/>
+          <p:nvPr/>
+        </p:nvSpPr>
+        <p:spPr>
+          <a:xfrm>
+            <a:off x="2705669" y="2837808"/>
+            <a:ext cx="112202" cy="648238"/>
+          </a:xfrm>
+          <a:prstGeom prst="rect">
+            <a:avLst/>
+          </a:prstGeom>
+        </p:spPr>
+        <p:style>
+          <a:lnRef idx="2">
+            <a:schemeClr val="accent1">
+              <a:shade val="50000"/>
+            </a:schemeClr>
+          </a:lnRef>
+          <a:fillRef idx="1">
+            <a:schemeClr val="accent1"/>
+          </a:fillRef>
+          <a:effectRef idx="0">
+            <a:schemeClr val="accent1"/>
+          </a:effectRef>
+          <a:fontRef idx="minor">
+            <a:schemeClr val="lt1"/>
+          </a:fontRef>
+        </p:style>
+        <p:txBody>
+          <a:bodyPr rtlCol="0" anchor="ctr"/>
+          <a:lstStyle/>
+          <a:p>
+            <a:pPr algn="ctr"/>
+            <a:endParaRPr lang="pt-BR"/>
+          </a:p>
+        </p:txBody>
+      </p:sp>
+      <p:sp>
+        <p:nvSpPr>
+          <p:cNvPr id="60" name="Retângulo 59">
+            <a:extLst>
+              <a:ext uri="{FF2B5EF4-FFF2-40B4-BE49-F238E27FC236}">
+                <a16:creationId xmlns:a16="http://schemas.microsoft.com/office/drawing/2014/main" id="{DFE40CF1-730E-6E43-DB69-4670901E173E}"/>
+              </a:ext>
+            </a:extLst>
+          </p:cNvPr>
+          <p:cNvSpPr/>
+          <p:nvPr/>
+        </p:nvSpPr>
+        <p:spPr>
+          <a:xfrm>
+            <a:off x="2934231" y="2837808"/>
+            <a:ext cx="112202" cy="648238"/>
+          </a:xfrm>
+          <a:prstGeom prst="rect">
+            <a:avLst/>
+          </a:prstGeom>
+        </p:spPr>
+        <p:style>
+          <a:lnRef idx="2">
+            <a:schemeClr val="accent1">
+              <a:shade val="50000"/>
+            </a:schemeClr>
+          </a:lnRef>
+          <a:fillRef idx="1">
+            <a:schemeClr val="accent1"/>
+          </a:fillRef>
+          <a:effectRef idx="0">
+            <a:schemeClr val="accent1"/>
+          </a:effectRef>
+          <a:fontRef idx="minor">
+            <a:schemeClr val="lt1"/>
+          </a:fontRef>
+        </p:style>
+        <p:txBody>
+          <a:bodyPr rtlCol="0" anchor="ctr"/>
+          <a:lstStyle/>
+          <a:p>
+            <a:pPr algn="ctr"/>
+            <a:endParaRPr lang="pt-BR"/>
+          </a:p>
+        </p:txBody>
+      </p:sp>
+      <p:sp>
+        <p:nvSpPr>
+          <p:cNvPr id="61" name="Retângulo 60">
+            <a:extLst>
+              <a:ext uri="{FF2B5EF4-FFF2-40B4-BE49-F238E27FC236}">
+                <a16:creationId xmlns:a16="http://schemas.microsoft.com/office/drawing/2014/main" id="{34D7AEEA-2374-AEE8-27BD-F3266900B6A3}"/>
+              </a:ext>
+            </a:extLst>
+          </p:cNvPr>
+          <p:cNvSpPr/>
+          <p:nvPr/>
+        </p:nvSpPr>
+        <p:spPr>
+          <a:xfrm>
+            <a:off x="3162793" y="2837808"/>
+            <a:ext cx="112202" cy="648238"/>
+          </a:xfrm>
+          <a:prstGeom prst="rect">
+            <a:avLst/>
+          </a:prstGeom>
+        </p:spPr>
+        <p:style>
+          <a:lnRef idx="2">
+            <a:schemeClr val="accent1">
+              <a:shade val="50000"/>
+            </a:schemeClr>
+          </a:lnRef>
+          <a:fillRef idx="1">
+            <a:schemeClr val="accent1"/>
+          </a:fillRef>
+          <a:effectRef idx="0">
+            <a:schemeClr val="accent1"/>
+          </a:effectRef>
+          <a:fontRef idx="minor">
+            <a:schemeClr val="lt1"/>
+          </a:fontRef>
+        </p:style>
+        <p:txBody>
+          <a:bodyPr rtlCol="0" anchor="ctr"/>
+          <a:lstStyle/>
+          <a:p>
+            <a:pPr algn="ctr"/>
+            <a:endParaRPr lang="pt-BR"/>
+          </a:p>
+        </p:txBody>
+      </p:sp>
+      <p:sp>
+        <p:nvSpPr>
+          <p:cNvPr id="62" name="Retângulo 61">
+            <a:extLst>
+              <a:ext uri="{FF2B5EF4-FFF2-40B4-BE49-F238E27FC236}">
+                <a16:creationId xmlns:a16="http://schemas.microsoft.com/office/drawing/2014/main" id="{88D259D0-BBC8-E3E5-DE7A-7200FD154790}"/>
+              </a:ext>
+            </a:extLst>
+          </p:cNvPr>
+          <p:cNvSpPr/>
+          <p:nvPr/>
+        </p:nvSpPr>
+        <p:spPr>
+          <a:xfrm>
+            <a:off x="3391355" y="2837808"/>
+            <a:ext cx="112202" cy="648238"/>
+          </a:xfrm>
+          <a:prstGeom prst="rect">
+            <a:avLst/>
+          </a:prstGeom>
+        </p:spPr>
+        <p:style>
+          <a:lnRef idx="2">
+            <a:schemeClr val="accent1">
+              <a:shade val="50000"/>
+            </a:schemeClr>
+          </a:lnRef>
+          <a:fillRef idx="1">
+            <a:schemeClr val="accent1"/>
+          </a:fillRef>
+          <a:effectRef idx="0">
+            <a:schemeClr val="accent1"/>
+          </a:effectRef>
+          <a:fontRef idx="minor">
+            <a:schemeClr val="lt1"/>
+          </a:fontRef>
+        </p:style>
+        <p:txBody>
+          <a:bodyPr rtlCol="0" anchor="ctr"/>
+          <a:lstStyle/>
+          <a:p>
+            <a:pPr algn="ctr"/>
+            <a:endParaRPr lang="pt-BR"/>
+          </a:p>
+        </p:txBody>
+      </p:sp>
+      <p:sp>
+        <p:nvSpPr>
+          <p:cNvPr id="63" name="Retângulo 62">
+            <a:extLst>
+              <a:ext uri="{FF2B5EF4-FFF2-40B4-BE49-F238E27FC236}">
+                <a16:creationId xmlns:a16="http://schemas.microsoft.com/office/drawing/2014/main" id="{19D8E2EB-2D42-D74E-9BFC-1F0DF918AE4B}"/>
+              </a:ext>
+            </a:extLst>
+          </p:cNvPr>
+          <p:cNvSpPr/>
+          <p:nvPr/>
+        </p:nvSpPr>
+        <p:spPr>
+          <a:xfrm>
+            <a:off x="3619917" y="2837808"/>
+            <a:ext cx="112202" cy="648238"/>
+          </a:xfrm>
+          <a:prstGeom prst="rect">
+            <a:avLst/>
+          </a:prstGeom>
+        </p:spPr>
+        <p:style>
+          <a:lnRef idx="2">
+            <a:schemeClr val="accent1">
+              <a:shade val="50000"/>
+            </a:schemeClr>
+          </a:lnRef>
+          <a:fillRef idx="1">
+            <a:schemeClr val="accent1"/>
+          </a:fillRef>
+          <a:effectRef idx="0">
+            <a:schemeClr val="accent1"/>
+          </a:effectRef>
+          <a:fontRef idx="minor">
+            <a:schemeClr val="lt1"/>
+          </a:fontRef>
+        </p:style>
+        <p:txBody>
+          <a:bodyPr rtlCol="0" anchor="ctr"/>
+          <a:lstStyle/>
+          <a:p>
+            <a:pPr algn="ctr"/>
+            <a:endParaRPr lang="pt-BR"/>
+          </a:p>
+        </p:txBody>
+      </p:sp>
+      <p:sp>
+        <p:nvSpPr>
+          <p:cNvPr id="64" name="Retângulo 63">
+            <a:extLst>
+              <a:ext uri="{FF2B5EF4-FFF2-40B4-BE49-F238E27FC236}">
+                <a16:creationId xmlns:a16="http://schemas.microsoft.com/office/drawing/2014/main" id="{94760C55-136D-020E-CC64-A65A6079481F}"/>
+              </a:ext>
+            </a:extLst>
+          </p:cNvPr>
+          <p:cNvSpPr/>
+          <p:nvPr/>
+        </p:nvSpPr>
+        <p:spPr>
+          <a:xfrm>
+            <a:off x="3848477" y="2837808"/>
+            <a:ext cx="112202" cy="648238"/>
+          </a:xfrm>
+          <a:prstGeom prst="rect">
+            <a:avLst/>
+          </a:prstGeom>
+        </p:spPr>
+        <p:style>
+          <a:lnRef idx="2">
+            <a:schemeClr val="accent1">
+              <a:shade val="50000"/>
+            </a:schemeClr>
+          </a:lnRef>
+          <a:fillRef idx="1">
+            <a:schemeClr val="accent1"/>
+          </a:fillRef>
+          <a:effectRef idx="0">
+            <a:schemeClr val="accent1"/>
+          </a:effectRef>
+          <a:fontRef idx="minor">
+            <a:schemeClr val="lt1"/>
+          </a:fontRef>
+        </p:style>
+        <p:txBody>
+          <a:bodyPr rtlCol="0" anchor="ctr"/>
+          <a:lstStyle/>
+          <a:p>
+            <a:pPr algn="ctr"/>
+            <a:endParaRPr lang="pt-BR"/>
+          </a:p>
+        </p:txBody>
+      </p:sp>
+      <p:sp>
+        <p:nvSpPr>
+          <p:cNvPr id="65" name="Retângulo 64">
+            <a:extLst>
+              <a:ext uri="{FF2B5EF4-FFF2-40B4-BE49-F238E27FC236}">
+                <a16:creationId xmlns:a16="http://schemas.microsoft.com/office/drawing/2014/main" id="{D7C62591-2924-3BF3-FFC1-29994586D832}"/>
+              </a:ext>
+            </a:extLst>
+          </p:cNvPr>
+          <p:cNvSpPr/>
+          <p:nvPr/>
+        </p:nvSpPr>
+        <p:spPr>
+          <a:xfrm>
+            <a:off x="4173795" y="2837808"/>
+            <a:ext cx="112202" cy="648238"/>
+          </a:xfrm>
+          <a:prstGeom prst="rect">
+            <a:avLst/>
+          </a:prstGeom>
+        </p:spPr>
+        <p:style>
+          <a:lnRef idx="2">
+            <a:schemeClr val="accent1">
+              <a:shade val="50000"/>
+            </a:schemeClr>
+          </a:lnRef>
+          <a:fillRef idx="1">
+            <a:schemeClr val="accent1"/>
+          </a:fillRef>
+          <a:effectRef idx="0">
+            <a:schemeClr val="accent1"/>
+          </a:effectRef>
+          <a:fontRef idx="minor">
+            <a:schemeClr val="lt1"/>
+          </a:fontRef>
+        </p:style>
+        <p:txBody>
+          <a:bodyPr rtlCol="0" anchor="ctr"/>
+          <a:lstStyle/>
+          <a:p>
+            <a:pPr algn="ctr"/>
+            <a:endParaRPr lang="pt-BR"/>
+          </a:p>
+        </p:txBody>
+      </p:sp>
+      <p:sp>
+        <p:nvSpPr>
+          <p:cNvPr id="66" name="Retângulo 65">
+            <a:extLst>
+              <a:ext uri="{FF2B5EF4-FFF2-40B4-BE49-F238E27FC236}">
+                <a16:creationId xmlns:a16="http://schemas.microsoft.com/office/drawing/2014/main" id="{EB72D09D-C206-3085-2415-3A610D0D5394}"/>
+              </a:ext>
+            </a:extLst>
+          </p:cNvPr>
+          <p:cNvSpPr/>
+          <p:nvPr/>
+        </p:nvSpPr>
+        <p:spPr>
+          <a:xfrm>
+            <a:off x="4604282" y="2837808"/>
+            <a:ext cx="112202" cy="648238"/>
+          </a:xfrm>
+          <a:prstGeom prst="rect">
+            <a:avLst/>
+          </a:prstGeom>
+        </p:spPr>
+        <p:style>
+          <a:lnRef idx="2">
+            <a:schemeClr val="accent1">
+              <a:shade val="50000"/>
+            </a:schemeClr>
+          </a:lnRef>
+          <a:fillRef idx="1">
+            <a:schemeClr val="accent1"/>
+          </a:fillRef>
+          <a:effectRef idx="0">
+            <a:schemeClr val="accent1"/>
+          </a:effectRef>
+          <a:fontRef idx="minor">
+            <a:schemeClr val="lt1"/>
+          </a:fontRef>
+        </p:style>
+        <p:txBody>
+          <a:bodyPr rtlCol="0" anchor="ctr"/>
+          <a:lstStyle/>
+          <a:p>
+            <a:pPr algn="ctr"/>
+            <a:endParaRPr lang="pt-BR"/>
+          </a:p>
+        </p:txBody>
+      </p:sp>
+      <p:sp>
+        <p:nvSpPr>
+          <p:cNvPr id="67" name="Seta: para Baixo 66">
+            <a:extLst>
+              <a:ext uri="{FF2B5EF4-FFF2-40B4-BE49-F238E27FC236}">
+                <a16:creationId xmlns:a16="http://schemas.microsoft.com/office/drawing/2014/main" id="{4D4E1F8A-943D-9A7A-180D-2285D29B6E09}"/>
+              </a:ext>
+            </a:extLst>
+          </p:cNvPr>
+          <p:cNvSpPr/>
+          <p:nvPr/>
+        </p:nvSpPr>
+        <p:spPr>
+          <a:xfrm rot="16200000">
+            <a:off x="1805110" y="2960395"/>
+            <a:ext cx="189261" cy="423259"/>
+          </a:xfrm>
+          <a:prstGeom prst="downArrow">
+            <a:avLst>
+              <a:gd name="adj1" fmla="val 27390"/>
+              <a:gd name="adj2" fmla="val 68841"/>
+            </a:avLst>
+          </a:prstGeom>
+          <a:solidFill>
+            <a:schemeClr val="tx1"/>
+          </a:solidFill>
+          <a:ln>
+            <a:solidFill>
+              <a:schemeClr val="tx1"/>
+            </a:solidFill>
+          </a:ln>
+        </p:spPr>
+        <p:style>
+          <a:lnRef idx="2">
+            <a:schemeClr val="accent1">
+              <a:shade val="50000"/>
+            </a:schemeClr>
+          </a:lnRef>
+          <a:fillRef idx="1">
+            <a:schemeClr val="accent1"/>
+          </a:fillRef>
+          <a:effectRef idx="0">
+            <a:schemeClr val="accent1"/>
+          </a:effectRef>
+          <a:fontRef idx="minor">
+            <a:schemeClr val="lt1"/>
+          </a:fontRef>
+        </p:style>
+        <p:txBody>
+          <a:bodyPr rtlCol="0" anchor="ctr"/>
+          <a:lstStyle/>
+          <a:p>
+            <a:pPr algn="ctr"/>
+            <a:endParaRPr lang="pt-BR"/>
+          </a:p>
+        </p:txBody>
+      </p:sp>
+      <p:sp>
+        <p:nvSpPr>
+          <p:cNvPr id="68" name="Retângulo 67">
+            <a:extLst>
+              <a:ext uri="{FF2B5EF4-FFF2-40B4-BE49-F238E27FC236}">
+                <a16:creationId xmlns:a16="http://schemas.microsoft.com/office/drawing/2014/main" id="{D8D874D7-74B2-9ED8-7E2D-F759074C682E}"/>
+              </a:ext>
+            </a:extLst>
+          </p:cNvPr>
+          <p:cNvSpPr/>
+          <p:nvPr/>
+        </p:nvSpPr>
+        <p:spPr>
+          <a:xfrm>
+            <a:off x="5577840" y="2837808"/>
+            <a:ext cx="1546166" cy="648238"/>
+          </a:xfrm>
+          <a:prstGeom prst="rect">
+            <a:avLst/>
+          </a:prstGeom>
+          <a:solidFill>
+            <a:schemeClr val="accent2">
+              <a:lumMod val="75000"/>
+            </a:schemeClr>
+          </a:solidFill>
+          <a:ln>
+            <a:solidFill>
+              <a:schemeClr val="accent2">
+                <a:lumMod val="20000"/>
+                <a:lumOff val="80000"/>
+              </a:schemeClr>
+            </a:solidFill>
+          </a:ln>
+        </p:spPr>
+        <p:style>
+          <a:lnRef idx="2">
+            <a:schemeClr val="accent1">
+              <a:shade val="50000"/>
+            </a:schemeClr>
+          </a:lnRef>
+          <a:fillRef idx="1">
+            <a:schemeClr val="accent1"/>
+          </a:fillRef>
+          <a:effectRef idx="0">
+            <a:schemeClr val="accent1"/>
+          </a:effectRef>
+          <a:fontRef idx="minor">
+            <a:schemeClr val="lt1"/>
+          </a:fontRef>
+        </p:style>
+        <p:txBody>
+          <a:bodyPr rtlCol="0" anchor="ctr"/>
+          <a:lstStyle/>
+          <a:p>
+            <a:pPr algn="ctr"/>
+            <a:r>
+              <a:rPr lang="pt-BR" dirty="0"/>
+              <a:t>Processador</a:t>
+            </a:r>
+          </a:p>
+        </p:txBody>
+      </p:sp>
+      <p:sp>
+        <p:nvSpPr>
+          <p:cNvPr id="69" name="Seta: para Baixo 68">
+            <a:extLst>
+              <a:ext uri="{FF2B5EF4-FFF2-40B4-BE49-F238E27FC236}">
+                <a16:creationId xmlns:a16="http://schemas.microsoft.com/office/drawing/2014/main" id="{BB2F8683-7463-B841-4657-EC1774F60BC8}"/>
+              </a:ext>
+            </a:extLst>
+          </p:cNvPr>
+          <p:cNvSpPr/>
+          <p:nvPr/>
+        </p:nvSpPr>
+        <p:spPr>
+          <a:xfrm rot="16200000">
+            <a:off x="5052722" y="2960395"/>
+            <a:ext cx="189261" cy="423259"/>
+          </a:xfrm>
+          <a:prstGeom prst="downArrow">
+            <a:avLst>
+              <a:gd name="adj1" fmla="val 27390"/>
+              <a:gd name="adj2" fmla="val 68841"/>
+            </a:avLst>
+          </a:prstGeom>
+          <a:solidFill>
+            <a:schemeClr val="tx1"/>
+          </a:solidFill>
+          <a:ln>
+            <a:solidFill>
+              <a:schemeClr val="tx1"/>
+            </a:solidFill>
+          </a:ln>
+        </p:spPr>
+        <p:style>
+          <a:lnRef idx="2">
+            <a:schemeClr val="accent1">
+              <a:shade val="50000"/>
+            </a:schemeClr>
+          </a:lnRef>
+          <a:fillRef idx="1">
+            <a:schemeClr val="accent1"/>
+          </a:fillRef>
+          <a:effectRef idx="0">
+            <a:schemeClr val="accent1"/>
+          </a:effectRef>
+          <a:fontRef idx="minor">
+            <a:schemeClr val="lt1"/>
+          </a:fontRef>
+        </p:style>
+        <p:txBody>
+          <a:bodyPr rtlCol="0" anchor="ctr"/>
+          <a:lstStyle/>
+          <a:p>
+            <a:pPr algn="ctr"/>
+            <a:endParaRPr lang="pt-BR"/>
+          </a:p>
+        </p:txBody>
+      </p:sp>
+      <p:sp>
+        <p:nvSpPr>
+          <p:cNvPr id="71" name="Retângulo 70">
+            <a:extLst>
+              <a:ext uri="{FF2B5EF4-FFF2-40B4-BE49-F238E27FC236}">
+                <a16:creationId xmlns:a16="http://schemas.microsoft.com/office/drawing/2014/main" id="{114C968E-8AB6-869A-9011-D07D4AFC30C4}"/>
+              </a:ext>
+            </a:extLst>
+          </p:cNvPr>
+          <p:cNvSpPr/>
+          <p:nvPr/>
+        </p:nvSpPr>
+        <p:spPr>
+          <a:xfrm>
+            <a:off x="2248544" y="3608120"/>
+            <a:ext cx="112203" cy="648238"/>
+          </a:xfrm>
+          <a:prstGeom prst="rect">
+            <a:avLst/>
+          </a:prstGeom>
+        </p:spPr>
+        <p:style>
+          <a:lnRef idx="2">
+            <a:schemeClr val="accent1">
+              <a:shade val="50000"/>
+            </a:schemeClr>
+          </a:lnRef>
+          <a:fillRef idx="1">
+            <a:schemeClr val="accent1"/>
+          </a:fillRef>
+          <a:effectRef idx="0">
+            <a:schemeClr val="accent1"/>
+          </a:effectRef>
+          <a:fontRef idx="minor">
+            <a:schemeClr val="lt1"/>
+          </a:fontRef>
+        </p:style>
+        <p:txBody>
+          <a:bodyPr rtlCol="0" anchor="ctr"/>
+          <a:lstStyle/>
+          <a:p>
+            <a:pPr algn="ctr"/>
+            <a:endParaRPr lang="pt-BR"/>
+          </a:p>
+        </p:txBody>
+      </p:sp>
+      <p:sp>
+        <p:nvSpPr>
+          <p:cNvPr id="72" name="Retângulo 71">
+            <a:extLst>
+              <a:ext uri="{FF2B5EF4-FFF2-40B4-BE49-F238E27FC236}">
+                <a16:creationId xmlns:a16="http://schemas.microsoft.com/office/drawing/2014/main" id="{F877A556-E460-7F3D-2F1D-CD0F5FEC2274}"/>
+              </a:ext>
+            </a:extLst>
+          </p:cNvPr>
+          <p:cNvSpPr/>
+          <p:nvPr/>
+        </p:nvSpPr>
+        <p:spPr>
+          <a:xfrm>
+            <a:off x="2477107" y="3608120"/>
+            <a:ext cx="112202" cy="648238"/>
+          </a:xfrm>
+          <a:prstGeom prst="rect">
+            <a:avLst/>
+          </a:prstGeom>
+        </p:spPr>
+        <p:style>
+          <a:lnRef idx="2">
+            <a:schemeClr val="accent1">
+              <a:shade val="50000"/>
+            </a:schemeClr>
+          </a:lnRef>
+          <a:fillRef idx="1">
+            <a:schemeClr val="accent1"/>
+          </a:fillRef>
+          <a:effectRef idx="0">
+            <a:schemeClr val="accent1"/>
+          </a:effectRef>
+          <a:fontRef idx="minor">
+            <a:schemeClr val="lt1"/>
+          </a:fontRef>
+        </p:style>
+        <p:txBody>
+          <a:bodyPr rtlCol="0" anchor="ctr"/>
+          <a:lstStyle/>
+          <a:p>
+            <a:pPr algn="ctr"/>
+            <a:endParaRPr lang="pt-BR"/>
+          </a:p>
+        </p:txBody>
+      </p:sp>
+      <p:sp>
+        <p:nvSpPr>
+          <p:cNvPr id="73" name="Retângulo 72">
+            <a:extLst>
+              <a:ext uri="{FF2B5EF4-FFF2-40B4-BE49-F238E27FC236}">
+                <a16:creationId xmlns:a16="http://schemas.microsoft.com/office/drawing/2014/main" id="{C8BEB666-53B1-154D-26A5-21E060A451FB}"/>
+              </a:ext>
+            </a:extLst>
+          </p:cNvPr>
+          <p:cNvSpPr/>
+          <p:nvPr/>
+        </p:nvSpPr>
+        <p:spPr>
+          <a:xfrm>
+            <a:off x="2705669" y="3608120"/>
+            <a:ext cx="112202" cy="648238"/>
+          </a:xfrm>
+          <a:prstGeom prst="rect">
+            <a:avLst/>
+          </a:prstGeom>
+        </p:spPr>
+        <p:style>
+          <a:lnRef idx="2">
+            <a:schemeClr val="accent1">
+              <a:shade val="50000"/>
+            </a:schemeClr>
+          </a:lnRef>
+          <a:fillRef idx="1">
+            <a:schemeClr val="accent1"/>
+          </a:fillRef>
+          <a:effectRef idx="0">
+            <a:schemeClr val="accent1"/>
+          </a:effectRef>
+          <a:fontRef idx="minor">
+            <a:schemeClr val="lt1"/>
+          </a:fontRef>
+        </p:style>
+        <p:txBody>
+          <a:bodyPr rtlCol="0" anchor="ctr"/>
+          <a:lstStyle/>
+          <a:p>
+            <a:pPr algn="ctr"/>
+            <a:endParaRPr lang="pt-BR"/>
+          </a:p>
+        </p:txBody>
+      </p:sp>
+      <p:sp>
+        <p:nvSpPr>
+          <p:cNvPr id="74" name="Retângulo 73">
+            <a:extLst>
+              <a:ext uri="{FF2B5EF4-FFF2-40B4-BE49-F238E27FC236}">
+                <a16:creationId xmlns:a16="http://schemas.microsoft.com/office/drawing/2014/main" id="{BF788C01-9792-867C-7108-6DA09DFDB275}"/>
+              </a:ext>
+            </a:extLst>
+          </p:cNvPr>
+          <p:cNvSpPr/>
+          <p:nvPr/>
+        </p:nvSpPr>
+        <p:spPr>
+          <a:xfrm>
+            <a:off x="2934231" y="3608120"/>
+            <a:ext cx="112202" cy="648238"/>
+          </a:xfrm>
+          <a:prstGeom prst="rect">
+            <a:avLst/>
+          </a:prstGeom>
+        </p:spPr>
+        <p:style>
+          <a:lnRef idx="2">
+            <a:schemeClr val="accent1">
+              <a:shade val="50000"/>
+            </a:schemeClr>
+          </a:lnRef>
+          <a:fillRef idx="1">
+            <a:schemeClr val="accent1"/>
+          </a:fillRef>
+          <a:effectRef idx="0">
+            <a:schemeClr val="accent1"/>
+          </a:effectRef>
+          <a:fontRef idx="minor">
+            <a:schemeClr val="lt1"/>
+          </a:fontRef>
+        </p:style>
+        <p:txBody>
+          <a:bodyPr rtlCol="0" anchor="ctr"/>
+          <a:lstStyle/>
+          <a:p>
+            <a:pPr algn="ctr"/>
+            <a:endParaRPr lang="pt-BR"/>
+          </a:p>
+        </p:txBody>
+      </p:sp>
+      <p:sp>
+        <p:nvSpPr>
+          <p:cNvPr id="75" name="Retângulo 74">
+            <a:extLst>
+              <a:ext uri="{FF2B5EF4-FFF2-40B4-BE49-F238E27FC236}">
+                <a16:creationId xmlns:a16="http://schemas.microsoft.com/office/drawing/2014/main" id="{3A95077B-77A2-8C23-8B65-3ECA71D6B9AD}"/>
+              </a:ext>
+            </a:extLst>
+          </p:cNvPr>
+          <p:cNvSpPr/>
+          <p:nvPr/>
+        </p:nvSpPr>
+        <p:spPr>
+          <a:xfrm>
+            <a:off x="3162793" y="3608120"/>
+            <a:ext cx="112202" cy="648238"/>
+          </a:xfrm>
+          <a:prstGeom prst="rect">
+            <a:avLst/>
+          </a:prstGeom>
+        </p:spPr>
+        <p:style>
+          <a:lnRef idx="2">
+            <a:schemeClr val="accent1">
+              <a:shade val="50000"/>
+            </a:schemeClr>
+          </a:lnRef>
+          <a:fillRef idx="1">
+            <a:schemeClr val="accent1"/>
+          </a:fillRef>
+          <a:effectRef idx="0">
+            <a:schemeClr val="accent1"/>
+          </a:effectRef>
+          <a:fontRef idx="minor">
+            <a:schemeClr val="lt1"/>
+          </a:fontRef>
+        </p:style>
+        <p:txBody>
+          <a:bodyPr rtlCol="0" anchor="ctr"/>
+          <a:lstStyle/>
+          <a:p>
+            <a:pPr algn="ctr"/>
+            <a:endParaRPr lang="pt-BR"/>
+          </a:p>
+        </p:txBody>
+      </p:sp>
+      <p:sp>
+        <p:nvSpPr>
+          <p:cNvPr id="76" name="Retângulo 75">
+            <a:extLst>
+              <a:ext uri="{FF2B5EF4-FFF2-40B4-BE49-F238E27FC236}">
+                <a16:creationId xmlns:a16="http://schemas.microsoft.com/office/drawing/2014/main" id="{FFECD86A-6CED-AEDF-A179-0548B89C89B9}"/>
+              </a:ext>
+            </a:extLst>
+          </p:cNvPr>
+          <p:cNvSpPr/>
+          <p:nvPr/>
+        </p:nvSpPr>
+        <p:spPr>
+          <a:xfrm>
+            <a:off x="3391355" y="3608120"/>
+            <a:ext cx="112202" cy="648238"/>
+          </a:xfrm>
+          <a:prstGeom prst="rect">
+            <a:avLst/>
+          </a:prstGeom>
+        </p:spPr>
+        <p:style>
+          <a:lnRef idx="2">
+            <a:schemeClr val="accent1">
+              <a:shade val="50000"/>
+            </a:schemeClr>
+          </a:lnRef>
+          <a:fillRef idx="1">
+            <a:schemeClr val="accent1"/>
+          </a:fillRef>
+          <a:effectRef idx="0">
+            <a:schemeClr val="accent1"/>
+          </a:effectRef>
+          <a:fontRef idx="minor">
+            <a:schemeClr val="lt1"/>
+          </a:fontRef>
+        </p:style>
+        <p:txBody>
+          <a:bodyPr rtlCol="0" anchor="ctr"/>
+          <a:lstStyle/>
+          <a:p>
+            <a:pPr algn="ctr"/>
+            <a:endParaRPr lang="pt-BR"/>
+          </a:p>
+        </p:txBody>
+      </p:sp>
+      <p:sp>
+        <p:nvSpPr>
+          <p:cNvPr id="77" name="Retângulo 76">
+            <a:extLst>
+              <a:ext uri="{FF2B5EF4-FFF2-40B4-BE49-F238E27FC236}">
+                <a16:creationId xmlns:a16="http://schemas.microsoft.com/office/drawing/2014/main" id="{C5FF7265-829F-57ED-B5C7-FA3E2C1858BA}"/>
+              </a:ext>
+            </a:extLst>
+          </p:cNvPr>
+          <p:cNvSpPr/>
+          <p:nvPr/>
+        </p:nvSpPr>
+        <p:spPr>
+          <a:xfrm>
+            <a:off x="3619917" y="3608120"/>
+            <a:ext cx="112202" cy="648238"/>
+          </a:xfrm>
+          <a:prstGeom prst="rect">
+            <a:avLst/>
+          </a:prstGeom>
+        </p:spPr>
+        <p:style>
+          <a:lnRef idx="2">
+            <a:schemeClr val="accent1">
+              <a:shade val="50000"/>
+            </a:schemeClr>
+          </a:lnRef>
+          <a:fillRef idx="1">
+            <a:schemeClr val="accent1"/>
+          </a:fillRef>
+          <a:effectRef idx="0">
+            <a:schemeClr val="accent1"/>
+          </a:effectRef>
+          <a:fontRef idx="minor">
+            <a:schemeClr val="lt1"/>
+          </a:fontRef>
+        </p:style>
+        <p:txBody>
+          <a:bodyPr rtlCol="0" anchor="ctr"/>
+          <a:lstStyle/>
+          <a:p>
+            <a:pPr algn="ctr"/>
+            <a:endParaRPr lang="pt-BR"/>
+          </a:p>
+        </p:txBody>
+      </p:sp>
+      <p:sp>
+        <p:nvSpPr>
+          <p:cNvPr id="78" name="Retângulo 77">
+            <a:extLst>
+              <a:ext uri="{FF2B5EF4-FFF2-40B4-BE49-F238E27FC236}">
+                <a16:creationId xmlns:a16="http://schemas.microsoft.com/office/drawing/2014/main" id="{FD18BBE8-DEF7-3029-7140-8307E923A9BD}"/>
+              </a:ext>
+            </a:extLst>
+          </p:cNvPr>
+          <p:cNvSpPr/>
+          <p:nvPr/>
+        </p:nvSpPr>
+        <p:spPr>
+          <a:xfrm>
+            <a:off x="3848477" y="3608120"/>
+            <a:ext cx="112202" cy="648238"/>
+          </a:xfrm>
+          <a:prstGeom prst="rect">
+            <a:avLst/>
+          </a:prstGeom>
+        </p:spPr>
+        <p:style>
+          <a:lnRef idx="2">
+            <a:schemeClr val="accent1">
+              <a:shade val="50000"/>
+            </a:schemeClr>
+          </a:lnRef>
+          <a:fillRef idx="1">
+            <a:schemeClr val="accent1"/>
+          </a:fillRef>
+          <a:effectRef idx="0">
+            <a:schemeClr val="accent1"/>
+          </a:effectRef>
+          <a:fontRef idx="minor">
+            <a:schemeClr val="lt1"/>
+          </a:fontRef>
+        </p:style>
+        <p:txBody>
+          <a:bodyPr rtlCol="0" anchor="ctr"/>
+          <a:lstStyle/>
+          <a:p>
+            <a:pPr algn="ctr"/>
+            <a:endParaRPr lang="pt-BR"/>
+          </a:p>
+        </p:txBody>
+      </p:sp>
+      <p:sp>
+        <p:nvSpPr>
+          <p:cNvPr id="79" name="Retângulo 78">
+            <a:extLst>
+              <a:ext uri="{FF2B5EF4-FFF2-40B4-BE49-F238E27FC236}">
+                <a16:creationId xmlns:a16="http://schemas.microsoft.com/office/drawing/2014/main" id="{6516627C-625F-F7E8-C4AE-DD058C3639AA}"/>
+              </a:ext>
+            </a:extLst>
+          </p:cNvPr>
+          <p:cNvSpPr/>
+          <p:nvPr/>
+        </p:nvSpPr>
+        <p:spPr>
+          <a:xfrm>
+            <a:off x="4173795" y="3608120"/>
+            <a:ext cx="112202" cy="648238"/>
+          </a:xfrm>
+          <a:prstGeom prst="rect">
+            <a:avLst/>
+          </a:prstGeom>
+        </p:spPr>
+        <p:style>
+          <a:lnRef idx="2">
+            <a:schemeClr val="accent1">
+              <a:shade val="50000"/>
+            </a:schemeClr>
+          </a:lnRef>
+          <a:fillRef idx="1">
+            <a:schemeClr val="accent1"/>
+          </a:fillRef>
+          <a:effectRef idx="0">
+            <a:schemeClr val="accent1"/>
+          </a:effectRef>
+          <a:fontRef idx="minor">
+            <a:schemeClr val="lt1"/>
+          </a:fontRef>
+        </p:style>
+        <p:txBody>
+          <a:bodyPr rtlCol="0" anchor="ctr"/>
+          <a:lstStyle/>
+          <a:p>
+            <a:pPr algn="ctr"/>
+            <a:endParaRPr lang="pt-BR"/>
+          </a:p>
+        </p:txBody>
+      </p:sp>
+      <p:sp>
+        <p:nvSpPr>
+          <p:cNvPr id="80" name="Retângulo 79">
+            <a:extLst>
+              <a:ext uri="{FF2B5EF4-FFF2-40B4-BE49-F238E27FC236}">
+                <a16:creationId xmlns:a16="http://schemas.microsoft.com/office/drawing/2014/main" id="{5D6DDB0B-C45C-1940-4FC2-4A1FA086E4A4}"/>
+              </a:ext>
+            </a:extLst>
+          </p:cNvPr>
+          <p:cNvSpPr/>
+          <p:nvPr/>
+        </p:nvSpPr>
+        <p:spPr>
+          <a:xfrm>
+            <a:off x="4604282" y="3608120"/>
+            <a:ext cx="112202" cy="648238"/>
+          </a:xfrm>
+          <a:prstGeom prst="rect">
+            <a:avLst/>
+          </a:prstGeom>
+        </p:spPr>
+        <p:style>
+          <a:lnRef idx="2">
+            <a:schemeClr val="accent1">
+              <a:shade val="50000"/>
+            </a:schemeClr>
+          </a:lnRef>
+          <a:fillRef idx="1">
+            <a:schemeClr val="accent1"/>
+          </a:fillRef>
+          <a:effectRef idx="0">
+            <a:schemeClr val="accent1"/>
+          </a:effectRef>
+          <a:fontRef idx="minor">
+            <a:schemeClr val="lt1"/>
+          </a:fontRef>
+        </p:style>
+        <p:txBody>
+          <a:bodyPr rtlCol="0" anchor="ctr"/>
+          <a:lstStyle/>
+          <a:p>
+            <a:pPr algn="ctr"/>
+            <a:endParaRPr lang="pt-BR"/>
+          </a:p>
+        </p:txBody>
+      </p:sp>
+      <p:sp>
+        <p:nvSpPr>
+          <p:cNvPr id="81" name="Seta: para Baixo 80">
+            <a:extLst>
+              <a:ext uri="{FF2B5EF4-FFF2-40B4-BE49-F238E27FC236}">
+                <a16:creationId xmlns:a16="http://schemas.microsoft.com/office/drawing/2014/main" id="{A9476B62-E7B1-1558-A324-7D972A3F2409}"/>
+              </a:ext>
+            </a:extLst>
+          </p:cNvPr>
+          <p:cNvSpPr/>
+          <p:nvPr/>
+        </p:nvSpPr>
+        <p:spPr>
+          <a:xfrm rot="16200000">
+            <a:off x="1805110" y="3730707"/>
+            <a:ext cx="189261" cy="423259"/>
+          </a:xfrm>
+          <a:prstGeom prst="downArrow">
+            <a:avLst>
+              <a:gd name="adj1" fmla="val 27390"/>
+              <a:gd name="adj2" fmla="val 68841"/>
+            </a:avLst>
+          </a:prstGeom>
+          <a:solidFill>
+            <a:schemeClr val="tx1"/>
+          </a:solidFill>
+          <a:ln>
+            <a:solidFill>
+              <a:schemeClr val="tx1"/>
+            </a:solidFill>
+          </a:ln>
+        </p:spPr>
+        <p:style>
+          <a:lnRef idx="2">
+            <a:schemeClr val="accent1">
+              <a:shade val="50000"/>
+            </a:schemeClr>
+          </a:lnRef>
+          <a:fillRef idx="1">
+            <a:schemeClr val="accent1"/>
+          </a:fillRef>
+          <a:effectRef idx="0">
+            <a:schemeClr val="accent1"/>
+          </a:effectRef>
+          <a:fontRef idx="minor">
+            <a:schemeClr val="lt1"/>
+          </a:fontRef>
+        </p:style>
+        <p:txBody>
+          <a:bodyPr rtlCol="0" anchor="ctr"/>
+          <a:lstStyle/>
+          <a:p>
+            <a:pPr algn="ctr"/>
+            <a:endParaRPr lang="pt-BR"/>
+          </a:p>
+        </p:txBody>
+      </p:sp>
+      <p:sp>
+        <p:nvSpPr>
+          <p:cNvPr id="82" name="Retângulo 81">
+            <a:extLst>
+              <a:ext uri="{FF2B5EF4-FFF2-40B4-BE49-F238E27FC236}">
+                <a16:creationId xmlns:a16="http://schemas.microsoft.com/office/drawing/2014/main" id="{05D66649-8740-196E-814F-518DD8427026}"/>
+              </a:ext>
+            </a:extLst>
+          </p:cNvPr>
+          <p:cNvSpPr/>
+          <p:nvPr/>
+        </p:nvSpPr>
+        <p:spPr>
+          <a:xfrm>
+            <a:off x="5577840" y="3608120"/>
+            <a:ext cx="1546166" cy="648238"/>
+          </a:xfrm>
+          <a:prstGeom prst="rect">
+            <a:avLst/>
+          </a:prstGeom>
+          <a:solidFill>
+            <a:schemeClr val="accent2">
+              <a:lumMod val="75000"/>
+            </a:schemeClr>
+          </a:solidFill>
+          <a:ln>
+            <a:solidFill>
+              <a:schemeClr val="accent2">
+                <a:lumMod val="20000"/>
+                <a:lumOff val="80000"/>
+              </a:schemeClr>
+            </a:solidFill>
+          </a:ln>
+        </p:spPr>
+        <p:style>
+          <a:lnRef idx="2">
+            <a:schemeClr val="accent1">
+              <a:shade val="50000"/>
+            </a:schemeClr>
+          </a:lnRef>
+          <a:fillRef idx="1">
+            <a:schemeClr val="accent1"/>
+          </a:fillRef>
+          <a:effectRef idx="0">
+            <a:schemeClr val="accent1"/>
+          </a:effectRef>
+          <a:fontRef idx="minor">
+            <a:schemeClr val="lt1"/>
+          </a:fontRef>
+        </p:style>
+        <p:txBody>
+          <a:bodyPr rtlCol="0" anchor="ctr"/>
+          <a:lstStyle/>
+          <a:p>
+            <a:pPr algn="ctr"/>
+            <a:r>
+              <a:rPr lang="pt-BR" dirty="0"/>
+              <a:t>Processador</a:t>
+            </a:r>
+          </a:p>
+        </p:txBody>
+      </p:sp>
+      <p:sp>
+        <p:nvSpPr>
+          <p:cNvPr id="83" name="Seta: para Baixo 82">
+            <a:extLst>
+              <a:ext uri="{FF2B5EF4-FFF2-40B4-BE49-F238E27FC236}">
+                <a16:creationId xmlns:a16="http://schemas.microsoft.com/office/drawing/2014/main" id="{1839A08F-D72D-E2C8-FAC3-5E32DC8E98ED}"/>
+              </a:ext>
+            </a:extLst>
+          </p:cNvPr>
+          <p:cNvSpPr/>
+          <p:nvPr/>
+        </p:nvSpPr>
+        <p:spPr>
+          <a:xfrm rot="16200000">
+            <a:off x="5052722" y="3730707"/>
+            <a:ext cx="189261" cy="423259"/>
+          </a:xfrm>
+          <a:prstGeom prst="downArrow">
+            <a:avLst>
+              <a:gd name="adj1" fmla="val 27390"/>
+              <a:gd name="adj2" fmla="val 68841"/>
+            </a:avLst>
+          </a:prstGeom>
+          <a:solidFill>
+            <a:schemeClr val="tx1"/>
+          </a:solidFill>
+          <a:ln>
+            <a:solidFill>
+              <a:schemeClr val="tx1"/>
+            </a:solidFill>
+          </a:ln>
+        </p:spPr>
+        <p:style>
+          <a:lnRef idx="2">
+            <a:schemeClr val="accent1">
+              <a:shade val="50000"/>
+            </a:schemeClr>
+          </a:lnRef>
+          <a:fillRef idx="1">
+            <a:schemeClr val="accent1"/>
+          </a:fillRef>
+          <a:effectRef idx="0">
+            <a:schemeClr val="accent1"/>
+          </a:effectRef>
+          <a:fontRef idx="minor">
+            <a:schemeClr val="lt1"/>
+          </a:fontRef>
+        </p:style>
+        <p:txBody>
+          <a:bodyPr rtlCol="0" anchor="ctr"/>
+          <a:lstStyle/>
+          <a:p>
+            <a:pPr algn="ctr"/>
+            <a:endParaRPr lang="pt-BR"/>
+          </a:p>
+        </p:txBody>
+      </p:sp>
+      <p:sp>
+        <p:nvSpPr>
+          <p:cNvPr id="85" name="Retângulo 84">
+            <a:extLst>
+              <a:ext uri="{FF2B5EF4-FFF2-40B4-BE49-F238E27FC236}">
+                <a16:creationId xmlns:a16="http://schemas.microsoft.com/office/drawing/2014/main" id="{6EF44BA5-6DE1-BC50-F436-4337092D5374}"/>
+              </a:ext>
+            </a:extLst>
+          </p:cNvPr>
+          <p:cNvSpPr/>
+          <p:nvPr/>
+        </p:nvSpPr>
+        <p:spPr>
+          <a:xfrm>
+            <a:off x="2248544" y="4347056"/>
+            <a:ext cx="112203" cy="648238"/>
+          </a:xfrm>
+          <a:prstGeom prst="rect">
+            <a:avLst/>
+          </a:prstGeom>
+        </p:spPr>
+        <p:style>
+          <a:lnRef idx="2">
+            <a:schemeClr val="accent1">
+              <a:shade val="50000"/>
+            </a:schemeClr>
+          </a:lnRef>
+          <a:fillRef idx="1">
+            <a:schemeClr val="accent1"/>
+          </a:fillRef>
+          <a:effectRef idx="0">
+            <a:schemeClr val="accent1"/>
+          </a:effectRef>
+          <a:fontRef idx="minor">
+            <a:schemeClr val="lt1"/>
+          </a:fontRef>
+        </p:style>
+        <p:txBody>
+          <a:bodyPr rtlCol="0" anchor="ctr"/>
+          <a:lstStyle/>
+          <a:p>
+            <a:pPr algn="ctr"/>
+            <a:endParaRPr lang="pt-BR"/>
+          </a:p>
+        </p:txBody>
+      </p:sp>
+      <p:sp>
+        <p:nvSpPr>
+          <p:cNvPr id="86" name="Retângulo 85">
+            <a:extLst>
+              <a:ext uri="{FF2B5EF4-FFF2-40B4-BE49-F238E27FC236}">
+                <a16:creationId xmlns:a16="http://schemas.microsoft.com/office/drawing/2014/main" id="{6D35AD5D-7EBB-3647-3798-BD530B9163A8}"/>
+              </a:ext>
+            </a:extLst>
+          </p:cNvPr>
+          <p:cNvSpPr/>
+          <p:nvPr/>
+        </p:nvSpPr>
+        <p:spPr>
+          <a:xfrm>
+            <a:off x="2477107" y="4347056"/>
+            <a:ext cx="112202" cy="648238"/>
+          </a:xfrm>
+          <a:prstGeom prst="rect">
+            <a:avLst/>
+          </a:prstGeom>
+        </p:spPr>
+        <p:style>
+          <a:lnRef idx="2">
+            <a:schemeClr val="accent1">
+              <a:shade val="50000"/>
+            </a:schemeClr>
+          </a:lnRef>
+          <a:fillRef idx="1">
+            <a:schemeClr val="accent1"/>
+          </a:fillRef>
+          <a:effectRef idx="0">
+            <a:schemeClr val="accent1"/>
+          </a:effectRef>
+          <a:fontRef idx="minor">
+            <a:schemeClr val="lt1"/>
+          </a:fontRef>
+        </p:style>
+        <p:txBody>
+          <a:bodyPr rtlCol="0" anchor="ctr"/>
+          <a:lstStyle/>
+          <a:p>
+            <a:pPr algn="ctr"/>
+            <a:endParaRPr lang="pt-BR"/>
+          </a:p>
+        </p:txBody>
+      </p:sp>
+      <p:sp>
+        <p:nvSpPr>
+          <p:cNvPr id="87" name="Retângulo 86">
+            <a:extLst>
+              <a:ext uri="{FF2B5EF4-FFF2-40B4-BE49-F238E27FC236}">
+                <a16:creationId xmlns:a16="http://schemas.microsoft.com/office/drawing/2014/main" id="{F18F238C-C65E-0185-D969-BB519A11E671}"/>
+              </a:ext>
+            </a:extLst>
+          </p:cNvPr>
+          <p:cNvSpPr/>
+          <p:nvPr/>
+        </p:nvSpPr>
+        <p:spPr>
+          <a:xfrm>
+            <a:off x="2705669" y="4347056"/>
+            <a:ext cx="112202" cy="648238"/>
+          </a:xfrm>
+          <a:prstGeom prst="rect">
+            <a:avLst/>
+          </a:prstGeom>
+        </p:spPr>
+        <p:style>
+          <a:lnRef idx="2">
+            <a:schemeClr val="accent1">
+              <a:shade val="50000"/>
+            </a:schemeClr>
+          </a:lnRef>
+          <a:fillRef idx="1">
+            <a:schemeClr val="accent1"/>
+          </a:fillRef>
+          <a:effectRef idx="0">
+            <a:schemeClr val="accent1"/>
+          </a:effectRef>
+          <a:fontRef idx="minor">
+            <a:schemeClr val="lt1"/>
+          </a:fontRef>
+        </p:style>
+        <p:txBody>
+          <a:bodyPr rtlCol="0" anchor="ctr"/>
+          <a:lstStyle/>
+          <a:p>
+            <a:pPr algn="ctr"/>
+            <a:endParaRPr lang="pt-BR"/>
+          </a:p>
+        </p:txBody>
+      </p:sp>
+      <p:sp>
+        <p:nvSpPr>
+          <p:cNvPr id="88" name="Retângulo 87">
+            <a:extLst>
+              <a:ext uri="{FF2B5EF4-FFF2-40B4-BE49-F238E27FC236}">
+                <a16:creationId xmlns:a16="http://schemas.microsoft.com/office/drawing/2014/main" id="{ADC983C2-9AEA-3174-70D3-69EC33614F45}"/>
+              </a:ext>
+            </a:extLst>
+          </p:cNvPr>
+          <p:cNvSpPr/>
+          <p:nvPr/>
+        </p:nvSpPr>
+        <p:spPr>
+          <a:xfrm>
+            <a:off x="2934231" y="4347056"/>
+            <a:ext cx="112202" cy="648238"/>
+          </a:xfrm>
+          <a:prstGeom prst="rect">
+            <a:avLst/>
+          </a:prstGeom>
+        </p:spPr>
+        <p:style>
+          <a:lnRef idx="2">
+            <a:schemeClr val="accent1">
+              <a:shade val="50000"/>
+            </a:schemeClr>
+          </a:lnRef>
+          <a:fillRef idx="1">
+            <a:schemeClr val="accent1"/>
+          </a:fillRef>
+          <a:effectRef idx="0">
+            <a:schemeClr val="accent1"/>
+          </a:effectRef>
+          <a:fontRef idx="minor">
+            <a:schemeClr val="lt1"/>
+          </a:fontRef>
+        </p:style>
+        <p:txBody>
+          <a:bodyPr rtlCol="0" anchor="ctr"/>
+          <a:lstStyle/>
+          <a:p>
+            <a:pPr algn="ctr"/>
+            <a:endParaRPr lang="pt-BR"/>
+          </a:p>
+        </p:txBody>
+      </p:sp>
+      <p:sp>
+        <p:nvSpPr>
+          <p:cNvPr id="89" name="Retângulo 88">
+            <a:extLst>
+              <a:ext uri="{FF2B5EF4-FFF2-40B4-BE49-F238E27FC236}">
+                <a16:creationId xmlns:a16="http://schemas.microsoft.com/office/drawing/2014/main" id="{747A7EA3-99B7-DCC7-7C2F-CBCFA3530DDD}"/>
+              </a:ext>
+            </a:extLst>
+          </p:cNvPr>
+          <p:cNvSpPr/>
+          <p:nvPr/>
+        </p:nvSpPr>
+        <p:spPr>
+          <a:xfrm>
+            <a:off x="3162793" y="4347056"/>
+            <a:ext cx="112202" cy="648238"/>
+          </a:xfrm>
+          <a:prstGeom prst="rect">
+            <a:avLst/>
+          </a:prstGeom>
+        </p:spPr>
+        <p:style>
+          <a:lnRef idx="2">
+            <a:schemeClr val="accent1">
+              <a:shade val="50000"/>
+            </a:schemeClr>
+          </a:lnRef>
+          <a:fillRef idx="1">
+            <a:schemeClr val="accent1"/>
+          </a:fillRef>
+          <a:effectRef idx="0">
+            <a:schemeClr val="accent1"/>
+          </a:effectRef>
+          <a:fontRef idx="minor">
+            <a:schemeClr val="lt1"/>
+          </a:fontRef>
+        </p:style>
+        <p:txBody>
+          <a:bodyPr rtlCol="0" anchor="ctr"/>
+          <a:lstStyle/>
+          <a:p>
+            <a:pPr algn="ctr"/>
+            <a:endParaRPr lang="pt-BR"/>
+          </a:p>
+        </p:txBody>
+      </p:sp>
+      <p:sp>
+        <p:nvSpPr>
+          <p:cNvPr id="90" name="Retângulo 89">
+            <a:extLst>
+              <a:ext uri="{FF2B5EF4-FFF2-40B4-BE49-F238E27FC236}">
+                <a16:creationId xmlns:a16="http://schemas.microsoft.com/office/drawing/2014/main" id="{9CBB7834-6773-6542-56D5-0C84599FB661}"/>
+              </a:ext>
+            </a:extLst>
+          </p:cNvPr>
+          <p:cNvSpPr/>
+          <p:nvPr/>
+        </p:nvSpPr>
+        <p:spPr>
+          <a:xfrm>
+            <a:off x="3391355" y="4347056"/>
+            <a:ext cx="112202" cy="648238"/>
+          </a:xfrm>
+          <a:prstGeom prst="rect">
+            <a:avLst/>
+          </a:prstGeom>
+        </p:spPr>
+        <p:style>
+          <a:lnRef idx="2">
+            <a:schemeClr val="accent1">
+              <a:shade val="50000"/>
+            </a:schemeClr>
+          </a:lnRef>
+          <a:fillRef idx="1">
+            <a:schemeClr val="accent1"/>
+          </a:fillRef>
+          <a:effectRef idx="0">
+            <a:schemeClr val="accent1"/>
+          </a:effectRef>
+          <a:fontRef idx="minor">
+            <a:schemeClr val="lt1"/>
+          </a:fontRef>
+        </p:style>
+        <p:txBody>
+          <a:bodyPr rtlCol="0" anchor="ctr"/>
+          <a:lstStyle/>
+          <a:p>
+            <a:pPr algn="ctr"/>
+            <a:endParaRPr lang="pt-BR"/>
+          </a:p>
+        </p:txBody>
+      </p:sp>
+      <p:sp>
+        <p:nvSpPr>
+          <p:cNvPr id="91" name="Retângulo 90">
+            <a:extLst>
+              <a:ext uri="{FF2B5EF4-FFF2-40B4-BE49-F238E27FC236}">
+                <a16:creationId xmlns:a16="http://schemas.microsoft.com/office/drawing/2014/main" id="{9FC4F547-A883-B89B-945A-E6A57A4F1E78}"/>
+              </a:ext>
+            </a:extLst>
+          </p:cNvPr>
+          <p:cNvSpPr/>
+          <p:nvPr/>
+        </p:nvSpPr>
+        <p:spPr>
+          <a:xfrm>
+            <a:off x="3619917" y="4347056"/>
+            <a:ext cx="112202" cy="648238"/>
+          </a:xfrm>
+          <a:prstGeom prst="rect">
+            <a:avLst/>
+          </a:prstGeom>
+        </p:spPr>
+        <p:style>
+          <a:lnRef idx="2">
+            <a:schemeClr val="accent1">
+              <a:shade val="50000"/>
+            </a:schemeClr>
+          </a:lnRef>
+          <a:fillRef idx="1">
+            <a:schemeClr val="accent1"/>
+          </a:fillRef>
+          <a:effectRef idx="0">
+            <a:schemeClr val="accent1"/>
+          </a:effectRef>
+          <a:fontRef idx="minor">
+            <a:schemeClr val="lt1"/>
+          </a:fontRef>
+        </p:style>
+        <p:txBody>
+          <a:bodyPr rtlCol="0" anchor="ctr"/>
+          <a:lstStyle/>
+          <a:p>
+            <a:pPr algn="ctr"/>
+            <a:endParaRPr lang="pt-BR"/>
+          </a:p>
+        </p:txBody>
+      </p:sp>
+      <p:sp>
+        <p:nvSpPr>
+          <p:cNvPr id="92" name="Retângulo 91">
+            <a:extLst>
+              <a:ext uri="{FF2B5EF4-FFF2-40B4-BE49-F238E27FC236}">
+                <a16:creationId xmlns:a16="http://schemas.microsoft.com/office/drawing/2014/main" id="{D9047E8C-6332-D420-5B9C-102302D65F11}"/>
+              </a:ext>
+            </a:extLst>
+          </p:cNvPr>
+          <p:cNvSpPr/>
+          <p:nvPr/>
+        </p:nvSpPr>
+        <p:spPr>
+          <a:xfrm>
+            <a:off x="3848477" y="4347056"/>
+            <a:ext cx="112202" cy="648238"/>
+          </a:xfrm>
+          <a:prstGeom prst="rect">
+            <a:avLst/>
+          </a:prstGeom>
+        </p:spPr>
+        <p:style>
+          <a:lnRef idx="2">
+            <a:schemeClr val="accent1">
+              <a:shade val="50000"/>
+            </a:schemeClr>
+          </a:lnRef>
+          <a:fillRef idx="1">
+            <a:schemeClr val="accent1"/>
+          </a:fillRef>
+          <a:effectRef idx="0">
+            <a:schemeClr val="accent1"/>
+          </a:effectRef>
+          <a:fontRef idx="minor">
+            <a:schemeClr val="lt1"/>
+          </a:fontRef>
+        </p:style>
+        <p:txBody>
+          <a:bodyPr rtlCol="0" anchor="ctr"/>
+          <a:lstStyle/>
+          <a:p>
+            <a:pPr algn="ctr"/>
+            <a:endParaRPr lang="pt-BR"/>
+          </a:p>
+        </p:txBody>
+      </p:sp>
+      <p:sp>
+        <p:nvSpPr>
+          <p:cNvPr id="93" name="Retângulo 92">
+            <a:extLst>
+              <a:ext uri="{FF2B5EF4-FFF2-40B4-BE49-F238E27FC236}">
+                <a16:creationId xmlns:a16="http://schemas.microsoft.com/office/drawing/2014/main" id="{391BB85F-3817-36B8-F94C-DFF35D4FE17F}"/>
+              </a:ext>
+            </a:extLst>
+          </p:cNvPr>
+          <p:cNvSpPr/>
+          <p:nvPr/>
+        </p:nvSpPr>
+        <p:spPr>
+          <a:xfrm>
+            <a:off x="4173795" y="4347056"/>
+            <a:ext cx="112202" cy="648238"/>
+          </a:xfrm>
+          <a:prstGeom prst="rect">
+            <a:avLst/>
+          </a:prstGeom>
+        </p:spPr>
+        <p:style>
+          <a:lnRef idx="2">
+            <a:schemeClr val="accent1">
+              <a:shade val="50000"/>
+            </a:schemeClr>
+          </a:lnRef>
+          <a:fillRef idx="1">
+            <a:schemeClr val="accent1"/>
+          </a:fillRef>
+          <a:effectRef idx="0">
+            <a:schemeClr val="accent1"/>
+          </a:effectRef>
+          <a:fontRef idx="minor">
+            <a:schemeClr val="lt1"/>
+          </a:fontRef>
+        </p:style>
+        <p:txBody>
+          <a:bodyPr rtlCol="0" anchor="ctr"/>
+          <a:lstStyle/>
+          <a:p>
+            <a:pPr algn="ctr"/>
+            <a:endParaRPr lang="pt-BR"/>
+          </a:p>
+        </p:txBody>
+      </p:sp>
+      <p:sp>
+        <p:nvSpPr>
+          <p:cNvPr id="94" name="Retângulo 93">
+            <a:extLst>
+              <a:ext uri="{FF2B5EF4-FFF2-40B4-BE49-F238E27FC236}">
+                <a16:creationId xmlns:a16="http://schemas.microsoft.com/office/drawing/2014/main" id="{D67A88F2-5AF9-69D4-6DC6-7748E9903E64}"/>
+              </a:ext>
+            </a:extLst>
+          </p:cNvPr>
+          <p:cNvSpPr/>
+          <p:nvPr/>
+        </p:nvSpPr>
+        <p:spPr>
+          <a:xfrm>
+            <a:off x="4604282" y="4347056"/>
+            <a:ext cx="112202" cy="648238"/>
+          </a:xfrm>
+          <a:prstGeom prst="rect">
+            <a:avLst/>
+          </a:prstGeom>
+        </p:spPr>
+        <p:style>
+          <a:lnRef idx="2">
+            <a:schemeClr val="accent1">
+              <a:shade val="50000"/>
+            </a:schemeClr>
+          </a:lnRef>
+          <a:fillRef idx="1">
+            <a:schemeClr val="accent1"/>
+          </a:fillRef>
+          <a:effectRef idx="0">
+            <a:schemeClr val="accent1"/>
+          </a:effectRef>
+          <a:fontRef idx="minor">
+            <a:schemeClr val="lt1"/>
+          </a:fontRef>
+        </p:style>
+        <p:txBody>
+          <a:bodyPr rtlCol="0" anchor="ctr"/>
+          <a:lstStyle/>
+          <a:p>
+            <a:pPr algn="ctr"/>
+            <a:endParaRPr lang="pt-BR"/>
+          </a:p>
+        </p:txBody>
+      </p:sp>
+      <p:sp>
+        <p:nvSpPr>
+          <p:cNvPr id="95" name="Seta: para Baixo 94">
+            <a:extLst>
+              <a:ext uri="{FF2B5EF4-FFF2-40B4-BE49-F238E27FC236}">
+                <a16:creationId xmlns:a16="http://schemas.microsoft.com/office/drawing/2014/main" id="{4FF24427-8BF9-41EC-E732-BAA8F676F037}"/>
+              </a:ext>
+            </a:extLst>
+          </p:cNvPr>
+          <p:cNvSpPr/>
+          <p:nvPr/>
+        </p:nvSpPr>
+        <p:spPr>
+          <a:xfrm rot="16200000">
+            <a:off x="1805110" y="4469643"/>
+            <a:ext cx="189261" cy="423259"/>
+          </a:xfrm>
+          <a:prstGeom prst="downArrow">
+            <a:avLst>
+              <a:gd name="adj1" fmla="val 27390"/>
+              <a:gd name="adj2" fmla="val 68841"/>
+            </a:avLst>
+          </a:prstGeom>
+          <a:solidFill>
+            <a:schemeClr val="tx1"/>
+          </a:solidFill>
+          <a:ln>
+            <a:solidFill>
+              <a:schemeClr val="tx1"/>
+            </a:solidFill>
+          </a:ln>
+        </p:spPr>
+        <p:style>
+          <a:lnRef idx="2">
+            <a:schemeClr val="accent1">
+              <a:shade val="50000"/>
+            </a:schemeClr>
+          </a:lnRef>
+          <a:fillRef idx="1">
+            <a:schemeClr val="accent1"/>
+          </a:fillRef>
+          <a:effectRef idx="0">
+            <a:schemeClr val="accent1"/>
+          </a:effectRef>
+          <a:fontRef idx="minor">
+            <a:schemeClr val="lt1"/>
+          </a:fontRef>
+        </p:style>
+        <p:txBody>
+          <a:bodyPr rtlCol="0" anchor="ctr"/>
+          <a:lstStyle/>
+          <a:p>
+            <a:pPr algn="ctr"/>
+            <a:endParaRPr lang="pt-BR"/>
+          </a:p>
+        </p:txBody>
+      </p:sp>
+      <p:sp>
+        <p:nvSpPr>
+          <p:cNvPr id="96" name="Retângulo 95">
+            <a:extLst>
+              <a:ext uri="{FF2B5EF4-FFF2-40B4-BE49-F238E27FC236}">
+                <a16:creationId xmlns:a16="http://schemas.microsoft.com/office/drawing/2014/main" id="{5C273070-54FC-BFDF-1720-4674F361F744}"/>
+              </a:ext>
+            </a:extLst>
+          </p:cNvPr>
+          <p:cNvSpPr/>
+          <p:nvPr/>
+        </p:nvSpPr>
+        <p:spPr>
+          <a:xfrm>
+            <a:off x="5577840" y="4347056"/>
+            <a:ext cx="1546166" cy="648238"/>
+          </a:xfrm>
+          <a:prstGeom prst="rect">
+            <a:avLst/>
+          </a:prstGeom>
+          <a:solidFill>
+            <a:schemeClr val="accent2">
+              <a:lumMod val="75000"/>
+            </a:schemeClr>
+          </a:solidFill>
+          <a:ln>
+            <a:solidFill>
+              <a:schemeClr val="accent2">
+                <a:lumMod val="20000"/>
+                <a:lumOff val="80000"/>
+              </a:schemeClr>
+            </a:solidFill>
+          </a:ln>
+        </p:spPr>
+        <p:style>
+          <a:lnRef idx="2">
+            <a:schemeClr val="accent1">
+              <a:shade val="50000"/>
+            </a:schemeClr>
+          </a:lnRef>
+          <a:fillRef idx="1">
+            <a:schemeClr val="accent1"/>
+          </a:fillRef>
+          <a:effectRef idx="0">
+            <a:schemeClr val="accent1"/>
+          </a:effectRef>
+          <a:fontRef idx="minor">
+            <a:schemeClr val="lt1"/>
+          </a:fontRef>
+        </p:style>
+        <p:txBody>
+          <a:bodyPr rtlCol="0" anchor="ctr"/>
+          <a:lstStyle/>
+          <a:p>
+            <a:pPr algn="ctr"/>
+            <a:r>
+              <a:rPr lang="pt-BR" dirty="0"/>
+              <a:t>Processador</a:t>
+            </a:r>
+          </a:p>
+        </p:txBody>
+      </p:sp>
+      <p:sp>
+        <p:nvSpPr>
+          <p:cNvPr id="97" name="Seta: para Baixo 96">
+            <a:extLst>
+              <a:ext uri="{FF2B5EF4-FFF2-40B4-BE49-F238E27FC236}">
+                <a16:creationId xmlns:a16="http://schemas.microsoft.com/office/drawing/2014/main" id="{E639154B-25DC-BC41-344C-9477BE7FBA21}"/>
+              </a:ext>
+            </a:extLst>
+          </p:cNvPr>
+          <p:cNvSpPr/>
+          <p:nvPr/>
+        </p:nvSpPr>
+        <p:spPr>
+          <a:xfrm rot="16200000">
+            <a:off x="5052722" y="4469643"/>
+            <a:ext cx="189261" cy="423259"/>
+          </a:xfrm>
+          <a:prstGeom prst="downArrow">
+            <a:avLst>
+              <a:gd name="adj1" fmla="val 27390"/>
+              <a:gd name="adj2" fmla="val 68841"/>
+            </a:avLst>
+          </a:prstGeom>
+          <a:solidFill>
+            <a:schemeClr val="tx1"/>
+          </a:solidFill>
+          <a:ln>
+            <a:solidFill>
+              <a:schemeClr val="tx1"/>
+            </a:solidFill>
+          </a:ln>
+        </p:spPr>
+        <p:style>
+          <a:lnRef idx="2">
+            <a:schemeClr val="accent1">
+              <a:shade val="50000"/>
+            </a:schemeClr>
+          </a:lnRef>
+          <a:fillRef idx="1">
+            <a:schemeClr val="accent1"/>
+          </a:fillRef>
+          <a:effectRef idx="0">
+            <a:schemeClr val="accent1"/>
+          </a:effectRef>
+          <a:fontRef idx="minor">
+            <a:schemeClr val="lt1"/>
+          </a:fontRef>
+        </p:style>
+        <p:txBody>
+          <a:bodyPr rtlCol="0" anchor="ctr"/>
+          <a:lstStyle/>
+          <a:p>
+            <a:pPr algn="ctr"/>
+            <a:endParaRPr lang="pt-BR"/>
+          </a:p>
+        </p:txBody>
+      </p:sp>
+      <p:sp>
+        <p:nvSpPr>
+          <p:cNvPr id="98" name="Retângulo 97">
+            <a:extLst>
+              <a:ext uri="{FF2B5EF4-FFF2-40B4-BE49-F238E27FC236}">
+                <a16:creationId xmlns:a16="http://schemas.microsoft.com/office/drawing/2014/main" id="{3645F465-7176-C3C9-BDF6-2B662CCB5883}"/>
+              </a:ext>
+            </a:extLst>
+          </p:cNvPr>
+          <p:cNvSpPr/>
+          <p:nvPr/>
+        </p:nvSpPr>
+        <p:spPr>
+          <a:xfrm>
+            <a:off x="232898" y="2786727"/>
+            <a:ext cx="1235973" cy="750114"/>
+          </a:xfrm>
+          <a:prstGeom prst="rect">
+            <a:avLst/>
+          </a:prstGeom>
+        </p:spPr>
+        <p:style>
+          <a:lnRef idx="2">
+            <a:schemeClr val="accent1">
+              <a:shade val="50000"/>
+            </a:schemeClr>
+          </a:lnRef>
+          <a:fillRef idx="1">
+            <a:schemeClr val="accent1"/>
+          </a:fillRef>
+          <a:effectRef idx="0">
+            <a:schemeClr val="accent1"/>
+          </a:effectRef>
+          <a:fontRef idx="minor">
+            <a:schemeClr val="lt1"/>
+          </a:fontRef>
+        </p:style>
+        <p:txBody>
+          <a:bodyPr rtlCol="0" anchor="ctr"/>
+          <a:lstStyle/>
+          <a:p>
+            <a:pPr algn="ctr"/>
+            <a:endParaRPr lang="pt-BR" dirty="0"/>
+          </a:p>
+        </p:txBody>
+      </p:sp>
+      <p:sp>
+        <p:nvSpPr>
+          <p:cNvPr id="100" name="Retângulo 99">
+            <a:extLst>
+              <a:ext uri="{FF2B5EF4-FFF2-40B4-BE49-F238E27FC236}">
+                <a16:creationId xmlns:a16="http://schemas.microsoft.com/office/drawing/2014/main" id="{BDD9798D-FB9F-0AA6-462D-88FED5299285}"/>
+              </a:ext>
+            </a:extLst>
+          </p:cNvPr>
+          <p:cNvSpPr/>
+          <p:nvPr/>
+        </p:nvSpPr>
+        <p:spPr>
+          <a:xfrm>
+            <a:off x="232898" y="3541423"/>
+            <a:ext cx="1235973" cy="750114"/>
+          </a:xfrm>
+          <a:prstGeom prst="rect">
+            <a:avLst/>
+          </a:prstGeom>
+        </p:spPr>
+        <p:style>
+          <a:lnRef idx="2">
+            <a:schemeClr val="accent1">
+              <a:shade val="50000"/>
+            </a:schemeClr>
+          </a:lnRef>
+          <a:fillRef idx="1">
+            <a:schemeClr val="accent1"/>
+          </a:fillRef>
+          <a:effectRef idx="0">
+            <a:schemeClr val="accent1"/>
+          </a:effectRef>
+          <a:fontRef idx="minor">
+            <a:schemeClr val="lt1"/>
+          </a:fontRef>
+        </p:style>
+        <p:txBody>
+          <a:bodyPr rtlCol="0" anchor="ctr"/>
+          <a:lstStyle/>
+          <a:p>
+            <a:pPr algn="ctr"/>
+            <a:endParaRPr lang="pt-BR" dirty="0"/>
+          </a:p>
+        </p:txBody>
+      </p:sp>
+      <p:sp>
+        <p:nvSpPr>
+          <p:cNvPr id="101" name="Retângulo 100">
+            <a:extLst>
+              <a:ext uri="{FF2B5EF4-FFF2-40B4-BE49-F238E27FC236}">
+                <a16:creationId xmlns:a16="http://schemas.microsoft.com/office/drawing/2014/main" id="{3AE0EBC3-27A7-5660-966E-675C181ABFBE}"/>
+              </a:ext>
+            </a:extLst>
+          </p:cNvPr>
+          <p:cNvSpPr/>
+          <p:nvPr/>
+        </p:nvSpPr>
+        <p:spPr>
+          <a:xfrm>
+            <a:off x="232898" y="4296118"/>
+            <a:ext cx="1235973" cy="750114"/>
+          </a:xfrm>
+          <a:prstGeom prst="rect">
+            <a:avLst/>
+          </a:prstGeom>
+        </p:spPr>
+        <p:style>
+          <a:lnRef idx="2">
+            <a:schemeClr val="accent1">
+              <a:shade val="50000"/>
+            </a:schemeClr>
+          </a:lnRef>
+          <a:fillRef idx="1">
+            <a:schemeClr val="accent1"/>
+          </a:fillRef>
+          <a:effectRef idx="0">
+            <a:schemeClr val="accent1"/>
+          </a:effectRef>
+          <a:fontRef idx="minor">
+            <a:schemeClr val="lt1"/>
+          </a:fontRef>
+        </p:style>
+        <p:txBody>
+          <a:bodyPr rtlCol="0" anchor="ctr"/>
+          <a:lstStyle/>
+          <a:p>
+            <a:pPr algn="ctr"/>
+            <a:endParaRPr lang="pt-BR" dirty="0"/>
+          </a:p>
+        </p:txBody>
+      </p:sp>
+    </p:spTree>
+    <p:extLst>
+      <p:ext uri="{BB962C8B-B14F-4D97-AF65-F5344CB8AC3E}">
+        <p14:creationId xmlns:p14="http://schemas.microsoft.com/office/powerpoint/2010/main" val="1718068100"/>
+      </p:ext>
+    </p:extLst>
+  </p:cSld>
+  <p:clrMapOvr>
+    <a:masterClrMapping/>
+  </p:clrMapOvr>
+</p:sld>
+</file>
+
+<file path=ppt/slides/slide12.xml><?xml version="1.0" encoding="utf-8"?>
+<p:sld xmlns:a="http://schemas.openxmlformats.org/drawingml/2006/main" xmlns:r="http://schemas.openxmlformats.org/officeDocument/2006/relationships" xmlns:p="http://schemas.openxmlformats.org/presentationml/2006/main">
+  <p:cSld>
+    <p:spTree>
+      <p:nvGrpSpPr>
+        <p:cNvPr id="1" name=""/>
+        <p:cNvGrpSpPr/>
+        <p:nvPr/>
+      </p:nvGrpSpPr>
+      <p:grpSpPr>
+        <a:xfrm>
+          <a:off x="0" y="0"/>
+          <a:ext cx="0" cy="0"/>
+          <a:chOff x="0" y="0"/>
+          <a:chExt cx="0" cy="0"/>
+        </a:xfrm>
+      </p:grpSpPr>
+      <p:sp>
+        <p:nvSpPr>
+          <p:cNvPr id="4" name="Retângulo 3">
+            <a:extLst>
+              <a:ext uri="{FF2B5EF4-FFF2-40B4-BE49-F238E27FC236}">
+                <a16:creationId xmlns:a16="http://schemas.microsoft.com/office/drawing/2014/main" id="{003499EE-0A8C-2622-7900-2AFCB5E91588}"/>
+              </a:ext>
+            </a:extLst>
+          </p:cNvPr>
+          <p:cNvSpPr/>
+          <p:nvPr/>
+        </p:nvSpPr>
+        <p:spPr>
+          <a:xfrm>
+            <a:off x="565266" y="448887"/>
+            <a:ext cx="2743445" cy="698269"/>
+          </a:xfrm>
+          <a:prstGeom prst="rect">
+            <a:avLst/>
+          </a:prstGeom>
+        </p:spPr>
+        <p:style>
+          <a:lnRef idx="2">
+            <a:schemeClr val="accent1">
+              <a:shade val="50000"/>
+            </a:schemeClr>
+          </a:lnRef>
+          <a:fillRef idx="1">
+            <a:schemeClr val="accent1"/>
+          </a:fillRef>
+          <a:effectRef idx="0">
+            <a:schemeClr val="accent1"/>
+          </a:effectRef>
+          <a:fontRef idx="minor">
+            <a:schemeClr val="lt1"/>
+          </a:fontRef>
+        </p:style>
+        <p:txBody>
+          <a:bodyPr rtlCol="0" anchor="ctr"/>
+          <a:lstStyle/>
+          <a:p>
+            <a:pPr algn="ctr"/>
+            <a:r>
+              <a:rPr lang="pt-BR" dirty="0"/>
+              <a:t>Problema</a:t>
+            </a:r>
+          </a:p>
+        </p:txBody>
+      </p:sp>
+      <p:sp>
+        <p:nvSpPr>
+          <p:cNvPr id="5" name="Retângulo 4">
+            <a:extLst>
+              <a:ext uri="{FF2B5EF4-FFF2-40B4-BE49-F238E27FC236}">
+                <a16:creationId xmlns:a16="http://schemas.microsoft.com/office/drawing/2014/main" id="{33102406-B7F4-EA39-85E8-FA3683FDAE32}"/>
+              </a:ext>
+            </a:extLst>
+          </p:cNvPr>
+          <p:cNvSpPr/>
+          <p:nvPr/>
+        </p:nvSpPr>
+        <p:spPr>
+          <a:xfrm>
+            <a:off x="565266" y="2069869"/>
+            <a:ext cx="122167" cy="1517073"/>
+          </a:xfrm>
+          <a:prstGeom prst="rect">
+            <a:avLst/>
+          </a:prstGeom>
+        </p:spPr>
+        <p:style>
+          <a:lnRef idx="2">
+            <a:schemeClr val="accent1">
+              <a:shade val="50000"/>
+            </a:schemeClr>
+          </a:lnRef>
+          <a:fillRef idx="1">
+            <a:schemeClr val="accent1"/>
+          </a:fillRef>
+          <a:effectRef idx="0">
+            <a:schemeClr val="accent1"/>
+          </a:effectRef>
+          <a:fontRef idx="minor">
+            <a:schemeClr val="lt1"/>
+          </a:fontRef>
+        </p:style>
+        <p:txBody>
+          <a:bodyPr rtlCol="0" anchor="ctr"/>
+          <a:lstStyle/>
+          <a:p>
+            <a:pPr algn="ctr"/>
+            <a:endParaRPr lang="pt-BR"/>
+          </a:p>
+        </p:txBody>
+      </p:sp>
+      <p:sp>
+        <p:nvSpPr>
+          <p:cNvPr id="6" name="Retângulo 5">
+            <a:extLst>
+              <a:ext uri="{FF2B5EF4-FFF2-40B4-BE49-F238E27FC236}">
+                <a16:creationId xmlns:a16="http://schemas.microsoft.com/office/drawing/2014/main" id="{A0E6D889-97A3-3BEF-23F1-70FA9E94CF04}"/>
+              </a:ext>
+            </a:extLst>
+          </p:cNvPr>
+          <p:cNvSpPr/>
+          <p:nvPr/>
+        </p:nvSpPr>
+        <p:spPr>
+          <a:xfrm>
+            <a:off x="784401" y="2069865"/>
+            <a:ext cx="122166" cy="1517073"/>
+          </a:xfrm>
+          <a:prstGeom prst="rect">
+            <a:avLst/>
+          </a:prstGeom>
+        </p:spPr>
+        <p:style>
+          <a:lnRef idx="2">
+            <a:schemeClr val="accent1">
+              <a:shade val="50000"/>
+            </a:schemeClr>
+          </a:lnRef>
+          <a:fillRef idx="1">
+            <a:schemeClr val="accent1"/>
+          </a:fillRef>
+          <a:effectRef idx="0">
+            <a:schemeClr val="accent1"/>
+          </a:effectRef>
+          <a:fontRef idx="minor">
+            <a:schemeClr val="lt1"/>
+          </a:fontRef>
+        </p:style>
+        <p:txBody>
+          <a:bodyPr rtlCol="0" anchor="ctr"/>
+          <a:lstStyle/>
+          <a:p>
+            <a:pPr algn="ctr"/>
+            <a:endParaRPr lang="pt-BR"/>
+          </a:p>
+        </p:txBody>
+      </p:sp>
+      <p:sp>
+        <p:nvSpPr>
+          <p:cNvPr id="7" name="Retângulo 6">
+            <a:extLst>
+              <a:ext uri="{FF2B5EF4-FFF2-40B4-BE49-F238E27FC236}">
+                <a16:creationId xmlns:a16="http://schemas.microsoft.com/office/drawing/2014/main" id="{2714C558-0AA1-C00E-3252-A34720EF1BD4}"/>
+              </a:ext>
+            </a:extLst>
+          </p:cNvPr>
+          <p:cNvSpPr/>
+          <p:nvPr/>
+        </p:nvSpPr>
+        <p:spPr>
+          <a:xfrm>
+            <a:off x="1003535" y="2069864"/>
+            <a:ext cx="122166" cy="1517073"/>
+          </a:xfrm>
+          <a:prstGeom prst="rect">
+            <a:avLst/>
+          </a:prstGeom>
+        </p:spPr>
+        <p:style>
+          <a:lnRef idx="2">
+            <a:schemeClr val="accent1">
+              <a:shade val="50000"/>
+            </a:schemeClr>
+          </a:lnRef>
+          <a:fillRef idx="1">
+            <a:schemeClr val="accent1"/>
+          </a:fillRef>
+          <a:effectRef idx="0">
+            <a:schemeClr val="accent1"/>
+          </a:effectRef>
+          <a:fontRef idx="minor">
+            <a:schemeClr val="lt1"/>
+          </a:fontRef>
+        </p:style>
+        <p:txBody>
+          <a:bodyPr rtlCol="0" anchor="ctr"/>
+          <a:lstStyle/>
+          <a:p>
+            <a:pPr algn="ctr"/>
+            <a:endParaRPr lang="pt-BR"/>
+          </a:p>
+        </p:txBody>
+      </p:sp>
+      <p:sp>
+        <p:nvSpPr>
+          <p:cNvPr id="8" name="Retângulo 7">
+            <a:extLst>
+              <a:ext uri="{FF2B5EF4-FFF2-40B4-BE49-F238E27FC236}">
+                <a16:creationId xmlns:a16="http://schemas.microsoft.com/office/drawing/2014/main" id="{1E1BD104-96E6-63AC-DB44-E93BA2A354EA}"/>
+              </a:ext>
+            </a:extLst>
+          </p:cNvPr>
+          <p:cNvSpPr/>
+          <p:nvPr/>
+        </p:nvSpPr>
+        <p:spPr>
+          <a:xfrm>
+            <a:off x="1222669" y="2069863"/>
+            <a:ext cx="122166" cy="1517073"/>
+          </a:xfrm>
+          <a:prstGeom prst="rect">
+            <a:avLst/>
+          </a:prstGeom>
+        </p:spPr>
+        <p:style>
+          <a:lnRef idx="2">
+            <a:schemeClr val="accent1">
+              <a:shade val="50000"/>
+            </a:schemeClr>
+          </a:lnRef>
+          <a:fillRef idx="1">
+            <a:schemeClr val="accent1"/>
+          </a:fillRef>
+          <a:effectRef idx="0">
+            <a:schemeClr val="accent1"/>
+          </a:effectRef>
+          <a:fontRef idx="minor">
+            <a:schemeClr val="lt1"/>
+          </a:fontRef>
+        </p:style>
+        <p:txBody>
+          <a:bodyPr rtlCol="0" anchor="ctr"/>
+          <a:lstStyle/>
+          <a:p>
+            <a:pPr algn="ctr"/>
+            <a:endParaRPr lang="pt-BR"/>
+          </a:p>
+        </p:txBody>
+      </p:sp>
+      <p:sp>
+        <p:nvSpPr>
+          <p:cNvPr id="9" name="Retângulo 8">
+            <a:extLst>
+              <a:ext uri="{FF2B5EF4-FFF2-40B4-BE49-F238E27FC236}">
+                <a16:creationId xmlns:a16="http://schemas.microsoft.com/office/drawing/2014/main" id="{02F29076-D1E9-9491-8885-E505C4C65823}"/>
+              </a:ext>
+            </a:extLst>
+          </p:cNvPr>
+          <p:cNvSpPr/>
+          <p:nvPr/>
+        </p:nvSpPr>
+        <p:spPr>
+          <a:xfrm>
+            <a:off x="1441803" y="2069862"/>
+            <a:ext cx="122166" cy="1517073"/>
+          </a:xfrm>
+          <a:prstGeom prst="rect">
+            <a:avLst/>
+          </a:prstGeom>
+        </p:spPr>
+        <p:style>
+          <a:lnRef idx="2">
+            <a:schemeClr val="accent1">
+              <a:shade val="50000"/>
+            </a:schemeClr>
+          </a:lnRef>
+          <a:fillRef idx="1">
+            <a:schemeClr val="accent1"/>
+          </a:fillRef>
+          <a:effectRef idx="0">
+            <a:schemeClr val="accent1"/>
+          </a:effectRef>
+          <a:fontRef idx="minor">
+            <a:schemeClr val="lt1"/>
+          </a:fontRef>
+        </p:style>
+        <p:txBody>
+          <a:bodyPr rtlCol="0" anchor="ctr"/>
+          <a:lstStyle/>
+          <a:p>
+            <a:pPr algn="ctr"/>
+            <a:endParaRPr lang="pt-BR"/>
+          </a:p>
+        </p:txBody>
+      </p:sp>
+      <p:sp>
+        <p:nvSpPr>
+          <p:cNvPr id="10" name="Retângulo 9">
+            <a:extLst>
+              <a:ext uri="{FF2B5EF4-FFF2-40B4-BE49-F238E27FC236}">
+                <a16:creationId xmlns:a16="http://schemas.microsoft.com/office/drawing/2014/main" id="{766504FE-80F4-83EF-D522-A43DED040D48}"/>
+              </a:ext>
+            </a:extLst>
+          </p:cNvPr>
+          <p:cNvSpPr/>
+          <p:nvPr/>
+        </p:nvSpPr>
+        <p:spPr>
+          <a:xfrm>
+            <a:off x="1660937" y="2069862"/>
+            <a:ext cx="122166" cy="1517073"/>
+          </a:xfrm>
+          <a:prstGeom prst="rect">
+            <a:avLst/>
+          </a:prstGeom>
+        </p:spPr>
+        <p:style>
+          <a:lnRef idx="2">
+            <a:schemeClr val="accent1">
+              <a:shade val="50000"/>
+            </a:schemeClr>
+          </a:lnRef>
+          <a:fillRef idx="1">
+            <a:schemeClr val="accent1"/>
+          </a:fillRef>
+          <a:effectRef idx="0">
+            <a:schemeClr val="accent1"/>
+          </a:effectRef>
+          <a:fontRef idx="minor">
+            <a:schemeClr val="lt1"/>
+          </a:fontRef>
+        </p:style>
+        <p:txBody>
+          <a:bodyPr rtlCol="0" anchor="ctr"/>
+          <a:lstStyle/>
+          <a:p>
+            <a:pPr algn="ctr"/>
+            <a:endParaRPr lang="pt-BR"/>
+          </a:p>
+        </p:txBody>
+      </p:sp>
+      <p:sp>
+        <p:nvSpPr>
+          <p:cNvPr id="11" name="Retângulo 10">
+            <a:extLst>
+              <a:ext uri="{FF2B5EF4-FFF2-40B4-BE49-F238E27FC236}">
+                <a16:creationId xmlns:a16="http://schemas.microsoft.com/office/drawing/2014/main" id="{387C6E13-1559-A973-54EB-5ABBF8FC1176}"/>
+              </a:ext>
+            </a:extLst>
+          </p:cNvPr>
+          <p:cNvSpPr/>
+          <p:nvPr/>
+        </p:nvSpPr>
+        <p:spPr>
+          <a:xfrm>
+            <a:off x="1936988" y="2069862"/>
+            <a:ext cx="122166" cy="1517073"/>
+          </a:xfrm>
+          <a:prstGeom prst="rect">
+            <a:avLst/>
+          </a:prstGeom>
+        </p:spPr>
+        <p:style>
+          <a:lnRef idx="2">
+            <a:schemeClr val="accent1">
+              <a:shade val="50000"/>
+            </a:schemeClr>
+          </a:lnRef>
+          <a:fillRef idx="1">
+            <a:schemeClr val="accent1"/>
+          </a:fillRef>
+          <a:effectRef idx="0">
+            <a:schemeClr val="accent1"/>
+          </a:effectRef>
+          <a:fontRef idx="minor">
+            <a:schemeClr val="lt1"/>
+          </a:fontRef>
+        </p:style>
+        <p:txBody>
+          <a:bodyPr rtlCol="0" anchor="ctr"/>
+          <a:lstStyle/>
+          <a:p>
+            <a:pPr algn="ctr"/>
+            <a:endParaRPr lang="pt-BR"/>
+          </a:p>
+        </p:txBody>
+      </p:sp>
+      <p:sp>
+        <p:nvSpPr>
+          <p:cNvPr id="12" name="Retângulo 11">
+            <a:extLst>
+              <a:ext uri="{FF2B5EF4-FFF2-40B4-BE49-F238E27FC236}">
+                <a16:creationId xmlns:a16="http://schemas.microsoft.com/office/drawing/2014/main" id="{67421ED2-2D4A-42E0-22A3-CF2E9095BEA3}"/>
+              </a:ext>
+            </a:extLst>
+          </p:cNvPr>
+          <p:cNvSpPr/>
+          <p:nvPr/>
+        </p:nvSpPr>
+        <p:spPr>
+          <a:xfrm>
+            <a:off x="2323143" y="2069862"/>
+            <a:ext cx="122166" cy="1517073"/>
+          </a:xfrm>
+          <a:prstGeom prst="rect">
+            <a:avLst/>
+          </a:prstGeom>
+        </p:spPr>
+        <p:style>
+          <a:lnRef idx="2">
+            <a:schemeClr val="accent1">
+              <a:shade val="50000"/>
+            </a:schemeClr>
+          </a:lnRef>
+          <a:fillRef idx="1">
+            <a:schemeClr val="accent1"/>
+          </a:fillRef>
+          <a:effectRef idx="0">
+            <a:schemeClr val="accent1"/>
+          </a:effectRef>
+          <a:fontRef idx="minor">
+            <a:schemeClr val="lt1"/>
+          </a:fontRef>
+        </p:style>
+        <p:txBody>
+          <a:bodyPr rtlCol="0" anchor="ctr"/>
+          <a:lstStyle/>
+          <a:p>
+            <a:pPr algn="ctr"/>
+            <a:endParaRPr lang="pt-BR"/>
+          </a:p>
+        </p:txBody>
+      </p:sp>
+      <p:sp>
+        <p:nvSpPr>
+          <p:cNvPr id="13" name="Retângulo 12">
+            <a:extLst>
+              <a:ext uri="{FF2B5EF4-FFF2-40B4-BE49-F238E27FC236}">
+                <a16:creationId xmlns:a16="http://schemas.microsoft.com/office/drawing/2014/main" id="{43CEE69A-8DCC-9577-69C8-19C5D74FAF43}"/>
+              </a:ext>
+            </a:extLst>
+          </p:cNvPr>
+          <p:cNvSpPr/>
+          <p:nvPr/>
+        </p:nvSpPr>
+        <p:spPr>
+          <a:xfrm>
+            <a:off x="2947719" y="2069862"/>
+            <a:ext cx="122166" cy="1517073"/>
+          </a:xfrm>
+          <a:prstGeom prst="rect">
+            <a:avLst/>
+          </a:prstGeom>
+        </p:spPr>
+        <p:style>
+          <a:lnRef idx="2">
+            <a:schemeClr val="accent1">
+              <a:shade val="50000"/>
+            </a:schemeClr>
+          </a:lnRef>
+          <a:fillRef idx="1">
+            <a:schemeClr val="accent1"/>
+          </a:fillRef>
+          <a:effectRef idx="0">
+            <a:schemeClr val="accent1"/>
+          </a:effectRef>
+          <a:fontRef idx="minor">
+            <a:schemeClr val="lt1"/>
+          </a:fontRef>
+        </p:style>
+        <p:txBody>
+          <a:bodyPr rtlCol="0" anchor="ctr"/>
+          <a:lstStyle/>
+          <a:p>
+            <a:pPr algn="ctr"/>
+            <a:endParaRPr lang="pt-BR"/>
+          </a:p>
+        </p:txBody>
+      </p:sp>
+      <p:sp>
+        <p:nvSpPr>
+          <p:cNvPr id="14" name="Retângulo 13">
+            <a:extLst>
+              <a:ext uri="{FF2B5EF4-FFF2-40B4-BE49-F238E27FC236}">
+                <a16:creationId xmlns:a16="http://schemas.microsoft.com/office/drawing/2014/main" id="{F027B751-A161-37A3-48DF-9FABFD3D46EB}"/>
+              </a:ext>
+            </a:extLst>
+          </p:cNvPr>
+          <p:cNvSpPr/>
+          <p:nvPr/>
+        </p:nvSpPr>
+        <p:spPr>
+          <a:xfrm>
+            <a:off x="3511212" y="2069862"/>
+            <a:ext cx="122166" cy="1517073"/>
+          </a:xfrm>
+          <a:prstGeom prst="rect">
+            <a:avLst/>
+          </a:prstGeom>
+        </p:spPr>
+        <p:style>
+          <a:lnRef idx="2">
+            <a:schemeClr val="accent1">
+              <a:shade val="50000"/>
+            </a:schemeClr>
+          </a:lnRef>
+          <a:fillRef idx="1">
+            <a:schemeClr val="accent1"/>
+          </a:fillRef>
+          <a:effectRef idx="0">
+            <a:schemeClr val="accent1"/>
+          </a:effectRef>
+          <a:fontRef idx="minor">
+            <a:schemeClr val="lt1"/>
+          </a:fontRef>
+        </p:style>
+        <p:txBody>
+          <a:bodyPr rtlCol="0" anchor="ctr"/>
+          <a:lstStyle/>
+          <a:p>
+            <a:pPr algn="ctr"/>
+            <a:endParaRPr lang="pt-BR"/>
+          </a:p>
+        </p:txBody>
+      </p:sp>
+      <p:sp>
+        <p:nvSpPr>
+          <p:cNvPr id="18" name="Seta: para Baixo 17">
+            <a:extLst>
+              <a:ext uri="{FF2B5EF4-FFF2-40B4-BE49-F238E27FC236}">
+                <a16:creationId xmlns:a16="http://schemas.microsoft.com/office/drawing/2014/main" id="{C6CA878B-DC54-C617-76A3-24547C59571E}"/>
+              </a:ext>
+            </a:extLst>
+          </p:cNvPr>
+          <p:cNvSpPr/>
+          <p:nvPr/>
+        </p:nvSpPr>
+        <p:spPr>
+          <a:xfrm>
+            <a:off x="1660937" y="1334187"/>
+            <a:ext cx="220593" cy="548644"/>
+          </a:xfrm>
+          <a:prstGeom prst="downArrow">
+            <a:avLst>
+              <a:gd name="adj1" fmla="val 27390"/>
+              <a:gd name="adj2" fmla="val 68841"/>
+            </a:avLst>
+          </a:prstGeom>
+          <a:solidFill>
+            <a:schemeClr val="tx1"/>
+          </a:solidFill>
+          <a:ln>
+            <a:solidFill>
+              <a:schemeClr val="tx1"/>
+            </a:solidFill>
+          </a:ln>
+        </p:spPr>
+        <p:style>
+          <a:lnRef idx="2">
+            <a:schemeClr val="accent1">
+              <a:shade val="50000"/>
+            </a:schemeClr>
+          </a:lnRef>
+          <a:fillRef idx="1">
+            <a:schemeClr val="accent1"/>
+          </a:fillRef>
+          <a:effectRef idx="0">
+            <a:schemeClr val="accent1"/>
+          </a:effectRef>
+          <a:fontRef idx="minor">
+            <a:schemeClr val="lt1"/>
+          </a:fontRef>
+        </p:style>
+        <p:txBody>
+          <a:bodyPr rtlCol="0" anchor="ctr"/>
+          <a:lstStyle/>
+          <a:p>
+            <a:pPr algn="ctr"/>
+            <a:endParaRPr lang="pt-BR"/>
+          </a:p>
+        </p:txBody>
+      </p:sp>
+      <p:sp>
+        <p:nvSpPr>
+          <p:cNvPr id="19" name="Seta: para Baixo 18">
+            <a:extLst>
+              <a:ext uri="{FF2B5EF4-FFF2-40B4-BE49-F238E27FC236}">
+                <a16:creationId xmlns:a16="http://schemas.microsoft.com/office/drawing/2014/main" id="{67CBC400-9DB3-7A23-63A2-A7BC2B6A6EBF}"/>
+              </a:ext>
+            </a:extLst>
+          </p:cNvPr>
+          <p:cNvSpPr/>
+          <p:nvPr/>
+        </p:nvSpPr>
+        <p:spPr>
+          <a:xfrm rot="16200000">
+            <a:off x="4013174" y="2554075"/>
+            <a:ext cx="220593" cy="548644"/>
+          </a:xfrm>
+          <a:prstGeom prst="downArrow">
+            <a:avLst>
+              <a:gd name="adj1" fmla="val 27390"/>
+              <a:gd name="adj2" fmla="val 68841"/>
+            </a:avLst>
+          </a:prstGeom>
+          <a:solidFill>
+            <a:schemeClr val="tx1"/>
+          </a:solidFill>
+          <a:ln>
+            <a:solidFill>
+              <a:schemeClr val="tx1"/>
+            </a:solidFill>
+          </a:ln>
+        </p:spPr>
+        <p:style>
+          <a:lnRef idx="2">
+            <a:schemeClr val="accent1">
+              <a:shade val="50000"/>
+            </a:schemeClr>
+          </a:lnRef>
+          <a:fillRef idx="1">
+            <a:schemeClr val="accent1"/>
+          </a:fillRef>
+          <a:effectRef idx="0">
+            <a:schemeClr val="accent1"/>
+          </a:effectRef>
+          <a:fontRef idx="minor">
+            <a:schemeClr val="lt1"/>
+          </a:fontRef>
+        </p:style>
+        <p:txBody>
+          <a:bodyPr rtlCol="0" anchor="ctr"/>
+          <a:lstStyle/>
+          <a:p>
+            <a:pPr algn="ctr"/>
+            <a:endParaRPr lang="pt-BR"/>
+          </a:p>
+        </p:txBody>
+      </p:sp>
+      <p:sp>
+        <p:nvSpPr>
+          <p:cNvPr id="20" name="Retângulo 19">
+            <a:extLst>
+              <a:ext uri="{FF2B5EF4-FFF2-40B4-BE49-F238E27FC236}">
+                <a16:creationId xmlns:a16="http://schemas.microsoft.com/office/drawing/2014/main" id="{A72F8819-9BF6-769D-72B2-241A1F212D0B}"/>
+              </a:ext>
+            </a:extLst>
+          </p:cNvPr>
+          <p:cNvSpPr/>
+          <p:nvPr/>
+        </p:nvSpPr>
+        <p:spPr>
+          <a:xfrm>
+            <a:off x="4613563" y="2069862"/>
+            <a:ext cx="1961803" cy="1517073"/>
+          </a:xfrm>
+          <a:prstGeom prst="rect">
+            <a:avLst/>
+          </a:prstGeom>
+          <a:solidFill>
+            <a:schemeClr val="accent2">
+              <a:lumMod val="75000"/>
+            </a:schemeClr>
+          </a:solidFill>
+          <a:ln>
+            <a:solidFill>
+              <a:schemeClr val="accent2">
+                <a:lumMod val="20000"/>
+                <a:lumOff val="80000"/>
+              </a:schemeClr>
+            </a:solidFill>
+          </a:ln>
+        </p:spPr>
+        <p:style>
+          <a:lnRef idx="2">
+            <a:schemeClr val="accent1">
+              <a:shade val="50000"/>
+            </a:schemeClr>
+          </a:lnRef>
+          <a:fillRef idx="1">
+            <a:schemeClr val="accent1"/>
+          </a:fillRef>
+          <a:effectRef idx="0">
+            <a:schemeClr val="accent1"/>
+          </a:effectRef>
+          <a:fontRef idx="minor">
+            <a:schemeClr val="lt1"/>
+          </a:fontRef>
+        </p:style>
+        <p:txBody>
+          <a:bodyPr rtlCol="0" anchor="ctr"/>
+          <a:lstStyle/>
+          <a:p>
+            <a:pPr algn="ctr"/>
+            <a:r>
+              <a:rPr lang="pt-BR" dirty="0"/>
+              <a:t>Processador</a:t>
+            </a:r>
+          </a:p>
+        </p:txBody>
+      </p:sp>
+      <p:sp>
+        <p:nvSpPr>
+          <p:cNvPr id="21" name="CaixaDeTexto 20">
+            <a:extLst>
+              <a:ext uri="{FF2B5EF4-FFF2-40B4-BE49-F238E27FC236}">
+                <a16:creationId xmlns:a16="http://schemas.microsoft.com/office/drawing/2014/main" id="{2E77C772-8980-CD8B-2CF3-54CCA1FD223C}"/>
+              </a:ext>
+            </a:extLst>
+          </p:cNvPr>
+          <p:cNvSpPr txBox="1"/>
+          <p:nvPr/>
+        </p:nvSpPr>
+        <p:spPr>
+          <a:xfrm>
+            <a:off x="2480177" y="1698165"/>
+            <a:ext cx="1153201" cy="369332"/>
+          </a:xfrm>
+          <a:prstGeom prst="rect">
+            <a:avLst/>
+          </a:prstGeom>
+          <a:noFill/>
+        </p:spPr>
+        <p:txBody>
+          <a:bodyPr wrap="none" rtlCol="0">
+            <a:spAutoFit/>
+          </a:bodyPr>
+          <a:lstStyle/>
+          <a:p>
+            <a:r>
+              <a:rPr lang="pt-BR" dirty="0"/>
+              <a:t>Instruções</a:t>
+            </a:r>
+          </a:p>
+        </p:txBody>
+      </p:sp>
+      <p:sp>
+        <p:nvSpPr>
+          <p:cNvPr id="22" name="CaixaDeTexto 21">
+            <a:extLst>
+              <a:ext uri="{FF2B5EF4-FFF2-40B4-BE49-F238E27FC236}">
+                <a16:creationId xmlns:a16="http://schemas.microsoft.com/office/drawing/2014/main" id="{BA7D6C83-C596-F9B6-82FF-0CD70D83FEAF}"/>
+              </a:ext>
+            </a:extLst>
+          </p:cNvPr>
+          <p:cNvSpPr txBox="1"/>
+          <p:nvPr/>
+        </p:nvSpPr>
+        <p:spPr>
+          <a:xfrm>
+            <a:off x="451899" y="3654427"/>
+            <a:ext cx="410690" cy="369332"/>
+          </a:xfrm>
+          <a:prstGeom prst="rect">
+            <a:avLst/>
+          </a:prstGeom>
+          <a:noFill/>
+        </p:spPr>
+        <p:txBody>
+          <a:bodyPr wrap="none" rtlCol="0">
+            <a:spAutoFit/>
+          </a:bodyPr>
+          <a:lstStyle/>
+          <a:p>
+            <a:r>
+              <a:rPr lang="pt-BR" dirty="0" err="1"/>
+              <a:t>tN</a:t>
+            </a:r>
+            <a:endParaRPr lang="pt-BR" dirty="0"/>
+          </a:p>
+        </p:txBody>
+      </p:sp>
+      <p:sp>
+        <p:nvSpPr>
+          <p:cNvPr id="23" name="CaixaDeTexto 22">
+            <a:extLst>
+              <a:ext uri="{FF2B5EF4-FFF2-40B4-BE49-F238E27FC236}">
+                <a16:creationId xmlns:a16="http://schemas.microsoft.com/office/drawing/2014/main" id="{C63A4C98-FB8D-819E-7961-267B4CD41EB7}"/>
+              </a:ext>
+            </a:extLst>
+          </p:cNvPr>
+          <p:cNvSpPr txBox="1"/>
+          <p:nvPr/>
+        </p:nvSpPr>
+        <p:spPr>
+          <a:xfrm>
+            <a:off x="3366950" y="3654427"/>
+            <a:ext cx="378630" cy="369332"/>
+          </a:xfrm>
+          <a:prstGeom prst="rect">
+            <a:avLst/>
+          </a:prstGeom>
+          <a:noFill/>
+        </p:spPr>
+        <p:txBody>
+          <a:bodyPr wrap="none" rtlCol="0">
+            <a:spAutoFit/>
+          </a:bodyPr>
+          <a:lstStyle/>
+          <a:p>
+            <a:r>
+              <a:rPr lang="pt-BR" dirty="0"/>
+              <a:t>t1</a:t>
+            </a:r>
+          </a:p>
+        </p:txBody>
+      </p:sp>
+      <p:sp>
+        <p:nvSpPr>
+          <p:cNvPr id="24" name="CaixaDeTexto 23">
+            <a:extLst>
+              <a:ext uri="{FF2B5EF4-FFF2-40B4-BE49-F238E27FC236}">
+                <a16:creationId xmlns:a16="http://schemas.microsoft.com/office/drawing/2014/main" id="{24D70D8B-4052-08F8-58A0-C01FD56E6480}"/>
+              </a:ext>
+            </a:extLst>
+          </p:cNvPr>
+          <p:cNvSpPr txBox="1"/>
+          <p:nvPr/>
+        </p:nvSpPr>
+        <p:spPr>
+          <a:xfrm>
+            <a:off x="2803457" y="3654427"/>
+            <a:ext cx="378630" cy="369332"/>
+          </a:xfrm>
+          <a:prstGeom prst="rect">
+            <a:avLst/>
+          </a:prstGeom>
+          <a:noFill/>
+        </p:spPr>
+        <p:txBody>
+          <a:bodyPr wrap="none" rtlCol="0">
+            <a:spAutoFit/>
+          </a:bodyPr>
+          <a:lstStyle/>
+          <a:p>
+            <a:r>
+              <a:rPr lang="pt-BR" dirty="0"/>
+              <a:t>t2</a:t>
+            </a:r>
+          </a:p>
+        </p:txBody>
+      </p:sp>
+    </p:spTree>
+    <p:extLst>
+      <p:ext uri="{BB962C8B-B14F-4D97-AF65-F5344CB8AC3E}">
+        <p14:creationId xmlns:p14="http://schemas.microsoft.com/office/powerpoint/2010/main" val="747482198"/>
       </p:ext>
     </p:extLst>
   </p:cSld>

</xml_diff>

<commit_message>
Pequenas correções em algumas equações
</commit_message>
<xml_diff>
--- a/imagens/ppt/desenhos_TCC.pptx
+++ b/imagens/ppt/desenhos_TCC.pptx
@@ -265,7 +265,7 @@
           <a:p>
             <a:fld id="{FF8DFCC8-87C9-4FC8-94E9-5E6D7726585C}" type="datetimeFigureOut">
               <a:rPr lang="pt-BR" smtClean="0"/>
-              <a:t>05/05/2022</a:t>
+              <a:t>11/06/2022</a:t>
             </a:fld>
             <a:endParaRPr lang="pt-BR"/>
           </a:p>
@@ -435,7 +435,7 @@
           <a:p>
             <a:fld id="{FF8DFCC8-87C9-4FC8-94E9-5E6D7726585C}" type="datetimeFigureOut">
               <a:rPr lang="pt-BR" smtClean="0"/>
-              <a:t>05/05/2022</a:t>
+              <a:t>11/06/2022</a:t>
             </a:fld>
             <a:endParaRPr lang="pt-BR"/>
           </a:p>
@@ -615,7 +615,7 @@
           <a:p>
             <a:fld id="{FF8DFCC8-87C9-4FC8-94E9-5E6D7726585C}" type="datetimeFigureOut">
               <a:rPr lang="pt-BR" smtClean="0"/>
-              <a:t>05/05/2022</a:t>
+              <a:t>11/06/2022</a:t>
             </a:fld>
             <a:endParaRPr lang="pt-BR"/>
           </a:p>
@@ -785,7 +785,7 @@
           <a:p>
             <a:fld id="{FF8DFCC8-87C9-4FC8-94E9-5E6D7726585C}" type="datetimeFigureOut">
               <a:rPr lang="pt-BR" smtClean="0"/>
-              <a:t>05/05/2022</a:t>
+              <a:t>11/06/2022</a:t>
             </a:fld>
             <a:endParaRPr lang="pt-BR"/>
           </a:p>
@@ -1029,7 +1029,7 @@
           <a:p>
             <a:fld id="{FF8DFCC8-87C9-4FC8-94E9-5E6D7726585C}" type="datetimeFigureOut">
               <a:rPr lang="pt-BR" smtClean="0"/>
-              <a:t>05/05/2022</a:t>
+              <a:t>11/06/2022</a:t>
             </a:fld>
             <a:endParaRPr lang="pt-BR"/>
           </a:p>
@@ -1261,7 +1261,7 @@
           <a:p>
             <a:fld id="{FF8DFCC8-87C9-4FC8-94E9-5E6D7726585C}" type="datetimeFigureOut">
               <a:rPr lang="pt-BR" smtClean="0"/>
-              <a:t>05/05/2022</a:t>
+              <a:t>11/06/2022</a:t>
             </a:fld>
             <a:endParaRPr lang="pt-BR"/>
           </a:p>
@@ -1628,7 +1628,7 @@
           <a:p>
             <a:fld id="{FF8DFCC8-87C9-4FC8-94E9-5E6D7726585C}" type="datetimeFigureOut">
               <a:rPr lang="pt-BR" smtClean="0"/>
-              <a:t>05/05/2022</a:t>
+              <a:t>11/06/2022</a:t>
             </a:fld>
             <a:endParaRPr lang="pt-BR"/>
           </a:p>
@@ -1746,7 +1746,7 @@
           <a:p>
             <a:fld id="{FF8DFCC8-87C9-4FC8-94E9-5E6D7726585C}" type="datetimeFigureOut">
               <a:rPr lang="pt-BR" smtClean="0"/>
-              <a:t>05/05/2022</a:t>
+              <a:t>11/06/2022</a:t>
             </a:fld>
             <a:endParaRPr lang="pt-BR"/>
           </a:p>
@@ -1841,7 +1841,7 @@
           <a:p>
             <a:fld id="{FF8DFCC8-87C9-4FC8-94E9-5E6D7726585C}" type="datetimeFigureOut">
               <a:rPr lang="pt-BR" smtClean="0"/>
-              <a:t>05/05/2022</a:t>
+              <a:t>11/06/2022</a:t>
             </a:fld>
             <a:endParaRPr lang="pt-BR"/>
           </a:p>
@@ -2118,7 +2118,7 @@
           <a:p>
             <a:fld id="{FF8DFCC8-87C9-4FC8-94E9-5E6D7726585C}" type="datetimeFigureOut">
               <a:rPr lang="pt-BR" smtClean="0"/>
-              <a:t>05/05/2022</a:t>
+              <a:t>11/06/2022</a:t>
             </a:fld>
             <a:endParaRPr lang="pt-BR"/>
           </a:p>
@@ -2375,7 +2375,7 @@
           <a:p>
             <a:fld id="{FF8DFCC8-87C9-4FC8-94E9-5E6D7726585C}" type="datetimeFigureOut">
               <a:rPr lang="pt-BR" smtClean="0"/>
-              <a:t>05/05/2022</a:t>
+              <a:t>11/06/2022</a:t>
             </a:fld>
             <a:endParaRPr lang="pt-BR"/>
           </a:p>
@@ -2588,7 +2588,7 @@
           <a:p>
             <a:fld id="{FF8DFCC8-87C9-4FC8-94E9-5E6D7726585C}" type="datetimeFigureOut">
               <a:rPr lang="pt-BR" smtClean="0"/>
-              <a:t>05/05/2022</a:t>
+              <a:t>11/06/2022</a:t>
             </a:fld>
             <a:endParaRPr lang="pt-BR"/>
           </a:p>
@@ -3600,7 +3600,7 @@
         <p:spPr>
           <a:xfrm>
             <a:off x="999305" y="135889"/>
-            <a:ext cx="546945" cy="369332"/>
+            <a:ext cx="359394" cy="369332"/>
           </a:xfrm>
           <a:prstGeom prst="rect">
             <a:avLst/>
@@ -3620,7 +3620,7 @@
           <a:p>
             <a:r>
               <a:rPr lang="pt-BR" dirty="0"/>
-              <a:t> n-1</a:t>
+              <a:t> n</a:t>
             </a:r>
           </a:p>
         </p:txBody>
@@ -3640,7 +3640,7 @@
         <p:spPr>
           <a:xfrm>
             <a:off x="4227473" y="135889"/>
-            <a:ext cx="359394" cy="369332"/>
+            <a:ext cx="591829" cy="369332"/>
           </a:xfrm>
           <a:prstGeom prst="rect">
             <a:avLst/>
@@ -3660,7 +3660,7 @@
           <a:p>
             <a:r>
               <a:rPr lang="pt-BR" dirty="0"/>
-              <a:t> n</a:t>
+              <a:t> n+1</a:t>
             </a:r>
           </a:p>
         </p:txBody>
@@ -28331,6 +28331,193 @@
           </a:fontRef>
         </p:style>
       </p:cxnSp>
+      <p:sp>
+        <p:nvSpPr>
+          <p:cNvPr id="2" name="CaixaDeTexto 1">
+            <a:extLst>
+              <a:ext uri="{FF2B5EF4-FFF2-40B4-BE49-F238E27FC236}">
+                <a16:creationId xmlns:a16="http://schemas.microsoft.com/office/drawing/2014/main" id="{E9500BDA-515E-96B1-6071-C0A1C6D65CCF}"/>
+              </a:ext>
+            </a:extLst>
+          </p:cNvPr>
+          <p:cNvSpPr txBox="1"/>
+          <p:nvPr/>
+        </p:nvSpPr>
+        <p:spPr>
+          <a:xfrm>
+            <a:off x="2856638" y="2157009"/>
+            <a:ext cx="399468" cy="369332"/>
+          </a:xfrm>
+          <a:prstGeom prst="rect">
+            <a:avLst/>
+          </a:prstGeom>
+          <a:noFill/>
+        </p:spPr>
+        <p:txBody>
+          <a:bodyPr wrap="none" rtlCol="0">
+            <a:spAutoFit/>
+          </a:bodyPr>
+          <a:lstStyle/>
+          <a:p>
+            <a:r>
+              <a:rPr lang="pt-BR" dirty="0"/>
+              <a:t>2L</a:t>
+            </a:r>
+          </a:p>
+        </p:txBody>
+      </p:sp>
+      <p:cxnSp>
+        <p:nvCxnSpPr>
+          <p:cNvPr id="30" name="Conector reto 29">
+            <a:extLst>
+              <a:ext uri="{FF2B5EF4-FFF2-40B4-BE49-F238E27FC236}">
+                <a16:creationId xmlns:a16="http://schemas.microsoft.com/office/drawing/2014/main" id="{81C88BB5-C11F-853D-15BC-1474AEB5D690}"/>
+              </a:ext>
+            </a:extLst>
+          </p:cNvPr>
+          <p:cNvCxnSpPr>
+            <a:cxnSpLocks/>
+          </p:cNvCxnSpPr>
+          <p:nvPr/>
+        </p:nvCxnSpPr>
+        <p:spPr>
+          <a:xfrm>
+            <a:off x="2022790" y="2175165"/>
+            <a:ext cx="1015735" cy="0"/>
+          </a:xfrm>
+          <a:prstGeom prst="line">
+            <a:avLst/>
+          </a:prstGeom>
+        </p:spPr>
+        <p:style>
+          <a:lnRef idx="3">
+            <a:schemeClr val="accent1"/>
+          </a:lnRef>
+          <a:fillRef idx="0">
+            <a:schemeClr val="accent1"/>
+          </a:fillRef>
+          <a:effectRef idx="2">
+            <a:schemeClr val="accent1"/>
+          </a:effectRef>
+          <a:fontRef idx="minor">
+            <a:schemeClr val="tx1"/>
+          </a:fontRef>
+        </p:style>
+      </p:cxnSp>
+      <p:cxnSp>
+        <p:nvCxnSpPr>
+          <p:cNvPr id="36" name="Conector reto 35">
+            <a:extLst>
+              <a:ext uri="{FF2B5EF4-FFF2-40B4-BE49-F238E27FC236}">
+                <a16:creationId xmlns:a16="http://schemas.microsoft.com/office/drawing/2014/main" id="{32F33DCD-03A3-2835-2190-8575EDAC741F}"/>
+              </a:ext>
+            </a:extLst>
+          </p:cNvPr>
+          <p:cNvCxnSpPr>
+            <a:cxnSpLocks/>
+          </p:cNvCxnSpPr>
+          <p:nvPr/>
+        </p:nvCxnSpPr>
+        <p:spPr>
+          <a:xfrm>
+            <a:off x="2022270" y="2003367"/>
+            <a:ext cx="0" cy="257693"/>
+          </a:xfrm>
+          <a:prstGeom prst="line">
+            <a:avLst/>
+          </a:prstGeom>
+        </p:spPr>
+        <p:style>
+          <a:lnRef idx="3">
+            <a:schemeClr val="accent1"/>
+          </a:lnRef>
+          <a:fillRef idx="0">
+            <a:schemeClr val="accent1"/>
+          </a:fillRef>
+          <a:effectRef idx="2">
+            <a:schemeClr val="accent1"/>
+          </a:effectRef>
+          <a:fontRef idx="minor">
+            <a:schemeClr val="tx1"/>
+          </a:fontRef>
+        </p:style>
+      </p:cxnSp>
+      <p:cxnSp>
+        <p:nvCxnSpPr>
+          <p:cNvPr id="37" name="Conector reto 36">
+            <a:extLst>
+              <a:ext uri="{FF2B5EF4-FFF2-40B4-BE49-F238E27FC236}">
+                <a16:creationId xmlns:a16="http://schemas.microsoft.com/office/drawing/2014/main" id="{E01CE3C6-7EB9-46BD-D53A-628F015B2FD8}"/>
+              </a:ext>
+            </a:extLst>
+          </p:cNvPr>
+          <p:cNvCxnSpPr>
+            <a:cxnSpLocks/>
+          </p:cNvCxnSpPr>
+          <p:nvPr/>
+        </p:nvCxnSpPr>
+        <p:spPr>
+          <a:xfrm>
+            <a:off x="3039959" y="2175165"/>
+            <a:ext cx="1015735" cy="0"/>
+          </a:xfrm>
+          <a:prstGeom prst="line">
+            <a:avLst/>
+          </a:prstGeom>
+        </p:spPr>
+        <p:style>
+          <a:lnRef idx="3">
+            <a:schemeClr val="accent1"/>
+          </a:lnRef>
+          <a:fillRef idx="0">
+            <a:schemeClr val="accent1"/>
+          </a:fillRef>
+          <a:effectRef idx="2">
+            <a:schemeClr val="accent1"/>
+          </a:effectRef>
+          <a:fontRef idx="minor">
+            <a:schemeClr val="tx1"/>
+          </a:fontRef>
+        </p:style>
+      </p:cxnSp>
+      <p:cxnSp>
+        <p:nvCxnSpPr>
+          <p:cNvPr id="38" name="Conector reto 37">
+            <a:extLst>
+              <a:ext uri="{FF2B5EF4-FFF2-40B4-BE49-F238E27FC236}">
+                <a16:creationId xmlns:a16="http://schemas.microsoft.com/office/drawing/2014/main" id="{EF88324D-E446-8D7E-28CA-F2E68319A9BF}"/>
+              </a:ext>
+            </a:extLst>
+          </p:cNvPr>
+          <p:cNvCxnSpPr>
+            <a:cxnSpLocks/>
+          </p:cNvCxnSpPr>
+          <p:nvPr/>
+        </p:nvCxnSpPr>
+        <p:spPr>
+          <a:xfrm>
+            <a:off x="4055694" y="2003367"/>
+            <a:ext cx="0" cy="257693"/>
+          </a:xfrm>
+          <a:prstGeom prst="line">
+            <a:avLst/>
+          </a:prstGeom>
+        </p:spPr>
+        <p:style>
+          <a:lnRef idx="3">
+            <a:schemeClr val="accent1"/>
+          </a:lnRef>
+          <a:fillRef idx="0">
+            <a:schemeClr val="accent1"/>
+          </a:fillRef>
+          <a:effectRef idx="2">
+            <a:schemeClr val="accent1"/>
+          </a:effectRef>
+          <a:fontRef idx="minor">
+            <a:schemeClr val="tx1"/>
+          </a:fontRef>
+        </p:style>
+      </p:cxnSp>
     </p:spTree>
     <p:extLst>
       <p:ext uri="{BB962C8B-B14F-4D97-AF65-F5344CB8AC3E}">

</xml_diff>